<commit_message>
Update gitbook 2024-05-17 20:49:09
</commit_message>
<xml_diff>
--- a/Databases.pptx
+++ b/Databases.pptx
@@ -5,25 +5,26 @@
     <p:sldMasterId id="2147483648" r:id="rId4"/>
   </p:sldMasterIdLst>
   <p:notesMasterIdLst>
-    <p:notesMasterId r:id="rId18"/>
+    <p:notesMasterId r:id="rId19"/>
   </p:notesMasterIdLst>
   <p:handoutMasterIdLst>
-    <p:handoutMasterId r:id="rId19"/>
+    <p:handoutMasterId r:id="rId20"/>
   </p:handoutMasterIdLst>
   <p:sldIdLst>
     <p:sldId id="256" r:id="rId5"/>
     <p:sldId id="257" r:id="rId6"/>
     <p:sldId id="278" r:id="rId7"/>
     <p:sldId id="279" r:id="rId8"/>
-    <p:sldId id="258" r:id="rId9"/>
-    <p:sldId id="280" r:id="rId10"/>
-    <p:sldId id="281" r:id="rId11"/>
-    <p:sldId id="282" r:id="rId12"/>
-    <p:sldId id="266" r:id="rId13"/>
-    <p:sldId id="283" r:id="rId14"/>
-    <p:sldId id="284" r:id="rId15"/>
-    <p:sldId id="285" r:id="rId16"/>
-    <p:sldId id="271" r:id="rId17"/>
+    <p:sldId id="290" r:id="rId9"/>
+    <p:sldId id="258" r:id="rId10"/>
+    <p:sldId id="286" r:id="rId11"/>
+    <p:sldId id="292" r:id="rId12"/>
+    <p:sldId id="291" r:id="rId13"/>
+    <p:sldId id="280" r:id="rId14"/>
+    <p:sldId id="287" r:id="rId15"/>
+    <p:sldId id="288" r:id="rId16"/>
+    <p:sldId id="289" r:id="rId17"/>
+    <p:sldId id="271" r:id="rId18"/>
   </p:sldIdLst>
   <p:sldSz cx="12192000" cy="6858000"/>
   <p:notesSz cx="6858000" cy="9144000"/>
@@ -755,342 +756,6 @@
 </p:notes>
 </file>
 
-<file path=ppt/notesSlides/notesSlide10.xml><?xml version="1.0" encoding="utf-8"?>
-<p:notes xmlns:a="http://schemas.openxmlformats.org/drawingml/2006/main" xmlns:r="http://schemas.openxmlformats.org/officeDocument/2006/relationships" xmlns:p="http://schemas.openxmlformats.org/presentationml/2006/main">
-  <p:cSld>
-    <p:spTree>
-      <p:nvGrpSpPr>
-        <p:cNvPr id="1" name=""/>
-        <p:cNvGrpSpPr/>
-        <p:nvPr/>
-      </p:nvGrpSpPr>
-      <p:grpSpPr>
-        <a:xfrm>
-          <a:off x="0" y="0"/>
-          <a:ext cx="0" cy="0"/>
-          <a:chOff x="0" y="0"/>
-          <a:chExt cx="0" cy="0"/>
-        </a:xfrm>
-      </p:grpSpPr>
-      <p:sp>
-        <p:nvSpPr>
-          <p:cNvPr id="2" name="Slide Image Placeholder 1"/>
-          <p:cNvSpPr>
-            <a:spLocks noGrp="1" noRot="1" noChangeAspect="1"/>
-          </p:cNvSpPr>
-          <p:nvPr>
-            <p:ph type="sldImg"/>
-          </p:nvPr>
-        </p:nvSpPr>
-        <p:spPr/>
-      </p:sp>
-      <p:sp>
-        <p:nvSpPr>
-          <p:cNvPr id="3" name="Notes Placeholder 2"/>
-          <p:cNvSpPr>
-            <a:spLocks noGrp="1"/>
-          </p:cNvSpPr>
-          <p:nvPr>
-            <p:ph type="body" idx="1"/>
-          </p:nvPr>
-        </p:nvSpPr>
-        <p:spPr/>
-        <p:txBody>
-          <a:bodyPr/>
-          <a:lstStyle/>
-          <a:p>
-            <a:endParaRPr lang="en-US" dirty="0"/>
-          </a:p>
-        </p:txBody>
-      </p:sp>
-      <p:sp>
-        <p:nvSpPr>
-          <p:cNvPr id="4" name="Slide Number Placeholder 3"/>
-          <p:cNvSpPr>
-            <a:spLocks noGrp="1"/>
-          </p:cNvSpPr>
-          <p:nvPr>
-            <p:ph type="sldNum" sz="quarter" idx="5"/>
-          </p:nvPr>
-        </p:nvSpPr>
-        <p:spPr/>
-        <p:txBody>
-          <a:bodyPr/>
-          <a:lstStyle/>
-          <a:p>
-            <a:fld id="{22289C57-55D7-40A4-A101-E74FAC7A092B}" type="slidenum">
-              <a:rPr lang="en-US" smtClean="0"/>
-              <a:t>10</a:t>
-            </a:fld>
-            <a:endParaRPr lang="en-US" dirty="0"/>
-          </a:p>
-        </p:txBody>
-      </p:sp>
-    </p:spTree>
-    <p:extLst>
-      <p:ext uri="{BB962C8B-B14F-4D97-AF65-F5344CB8AC3E}">
-        <p14:creationId xmlns:p14="http://schemas.microsoft.com/office/powerpoint/2010/main" val="840986708"/>
-      </p:ext>
-    </p:extLst>
-  </p:cSld>
-  <p:clrMapOvr>
-    <a:masterClrMapping/>
-  </p:clrMapOvr>
-</p:notes>
-</file>
-
-<file path=ppt/notesSlides/notesSlide11.xml><?xml version="1.0" encoding="utf-8"?>
-<p:notes xmlns:a="http://schemas.openxmlformats.org/drawingml/2006/main" xmlns:r="http://schemas.openxmlformats.org/officeDocument/2006/relationships" xmlns:p="http://schemas.openxmlformats.org/presentationml/2006/main">
-  <p:cSld>
-    <p:spTree>
-      <p:nvGrpSpPr>
-        <p:cNvPr id="1" name=""/>
-        <p:cNvGrpSpPr/>
-        <p:nvPr/>
-      </p:nvGrpSpPr>
-      <p:grpSpPr>
-        <a:xfrm>
-          <a:off x="0" y="0"/>
-          <a:ext cx="0" cy="0"/>
-          <a:chOff x="0" y="0"/>
-          <a:chExt cx="0" cy="0"/>
-        </a:xfrm>
-      </p:grpSpPr>
-      <p:sp>
-        <p:nvSpPr>
-          <p:cNvPr id="2" name="Slide Image Placeholder 1"/>
-          <p:cNvSpPr>
-            <a:spLocks noGrp="1" noRot="1" noChangeAspect="1"/>
-          </p:cNvSpPr>
-          <p:nvPr>
-            <p:ph type="sldImg"/>
-          </p:nvPr>
-        </p:nvSpPr>
-        <p:spPr/>
-      </p:sp>
-      <p:sp>
-        <p:nvSpPr>
-          <p:cNvPr id="3" name="Notes Placeholder 2"/>
-          <p:cNvSpPr>
-            <a:spLocks noGrp="1"/>
-          </p:cNvSpPr>
-          <p:nvPr>
-            <p:ph type="body" idx="1"/>
-          </p:nvPr>
-        </p:nvSpPr>
-        <p:spPr/>
-        <p:txBody>
-          <a:bodyPr/>
-          <a:lstStyle/>
-          <a:p>
-            <a:endParaRPr lang="en-US" dirty="0"/>
-          </a:p>
-        </p:txBody>
-      </p:sp>
-      <p:sp>
-        <p:nvSpPr>
-          <p:cNvPr id="4" name="Slide Number Placeholder 3"/>
-          <p:cNvSpPr>
-            <a:spLocks noGrp="1"/>
-          </p:cNvSpPr>
-          <p:nvPr>
-            <p:ph type="sldNum" sz="quarter" idx="5"/>
-          </p:nvPr>
-        </p:nvSpPr>
-        <p:spPr/>
-        <p:txBody>
-          <a:bodyPr/>
-          <a:lstStyle/>
-          <a:p>
-            <a:fld id="{22289C57-55D7-40A4-A101-E74FAC7A092B}" type="slidenum">
-              <a:rPr lang="en-US" smtClean="0"/>
-              <a:t>11</a:t>
-            </a:fld>
-            <a:endParaRPr lang="en-US" dirty="0"/>
-          </a:p>
-        </p:txBody>
-      </p:sp>
-    </p:spTree>
-    <p:extLst>
-      <p:ext uri="{BB962C8B-B14F-4D97-AF65-F5344CB8AC3E}">
-        <p14:creationId xmlns:p14="http://schemas.microsoft.com/office/powerpoint/2010/main" val="575465472"/>
-      </p:ext>
-    </p:extLst>
-  </p:cSld>
-  <p:clrMapOvr>
-    <a:masterClrMapping/>
-  </p:clrMapOvr>
-</p:notes>
-</file>
-
-<file path=ppt/notesSlides/notesSlide12.xml><?xml version="1.0" encoding="utf-8"?>
-<p:notes xmlns:a="http://schemas.openxmlformats.org/drawingml/2006/main" xmlns:r="http://schemas.openxmlformats.org/officeDocument/2006/relationships" xmlns:p="http://schemas.openxmlformats.org/presentationml/2006/main">
-  <p:cSld>
-    <p:spTree>
-      <p:nvGrpSpPr>
-        <p:cNvPr id="1" name=""/>
-        <p:cNvGrpSpPr/>
-        <p:nvPr/>
-      </p:nvGrpSpPr>
-      <p:grpSpPr>
-        <a:xfrm>
-          <a:off x="0" y="0"/>
-          <a:ext cx="0" cy="0"/>
-          <a:chOff x="0" y="0"/>
-          <a:chExt cx="0" cy="0"/>
-        </a:xfrm>
-      </p:grpSpPr>
-      <p:sp>
-        <p:nvSpPr>
-          <p:cNvPr id="2" name="Slide Image Placeholder 1"/>
-          <p:cNvSpPr>
-            <a:spLocks noGrp="1" noRot="1" noChangeAspect="1"/>
-          </p:cNvSpPr>
-          <p:nvPr>
-            <p:ph type="sldImg"/>
-          </p:nvPr>
-        </p:nvSpPr>
-        <p:spPr/>
-      </p:sp>
-      <p:sp>
-        <p:nvSpPr>
-          <p:cNvPr id="3" name="Notes Placeholder 2"/>
-          <p:cNvSpPr>
-            <a:spLocks noGrp="1"/>
-          </p:cNvSpPr>
-          <p:nvPr>
-            <p:ph type="body" idx="1"/>
-          </p:nvPr>
-        </p:nvSpPr>
-        <p:spPr/>
-        <p:txBody>
-          <a:bodyPr/>
-          <a:lstStyle/>
-          <a:p>
-            <a:endParaRPr lang="en-US" dirty="0"/>
-          </a:p>
-        </p:txBody>
-      </p:sp>
-      <p:sp>
-        <p:nvSpPr>
-          <p:cNvPr id="4" name="Slide Number Placeholder 3"/>
-          <p:cNvSpPr>
-            <a:spLocks noGrp="1"/>
-          </p:cNvSpPr>
-          <p:nvPr>
-            <p:ph type="sldNum" sz="quarter" idx="5"/>
-          </p:nvPr>
-        </p:nvSpPr>
-        <p:spPr/>
-        <p:txBody>
-          <a:bodyPr/>
-          <a:lstStyle/>
-          <a:p>
-            <a:fld id="{22289C57-55D7-40A4-A101-E74FAC7A092B}" type="slidenum">
-              <a:rPr lang="en-US" smtClean="0"/>
-              <a:t>12</a:t>
-            </a:fld>
-            <a:endParaRPr lang="en-US" dirty="0"/>
-          </a:p>
-        </p:txBody>
-      </p:sp>
-    </p:spTree>
-    <p:extLst>
-      <p:ext uri="{BB962C8B-B14F-4D97-AF65-F5344CB8AC3E}">
-        <p14:creationId xmlns:p14="http://schemas.microsoft.com/office/powerpoint/2010/main" val="537756"/>
-      </p:ext>
-    </p:extLst>
-  </p:cSld>
-  <p:clrMapOvr>
-    <a:masterClrMapping/>
-  </p:clrMapOvr>
-</p:notes>
-</file>
-
-<file path=ppt/notesSlides/notesSlide13.xml><?xml version="1.0" encoding="utf-8"?>
-<p:notes xmlns:a="http://schemas.openxmlformats.org/drawingml/2006/main" xmlns:r="http://schemas.openxmlformats.org/officeDocument/2006/relationships" xmlns:p="http://schemas.openxmlformats.org/presentationml/2006/main">
-  <p:cSld>
-    <p:spTree>
-      <p:nvGrpSpPr>
-        <p:cNvPr id="1" name=""/>
-        <p:cNvGrpSpPr/>
-        <p:nvPr/>
-      </p:nvGrpSpPr>
-      <p:grpSpPr>
-        <a:xfrm>
-          <a:off x="0" y="0"/>
-          <a:ext cx="0" cy="0"/>
-          <a:chOff x="0" y="0"/>
-          <a:chExt cx="0" cy="0"/>
-        </a:xfrm>
-      </p:grpSpPr>
-      <p:sp>
-        <p:nvSpPr>
-          <p:cNvPr id="2" name="Slide Image Placeholder 1"/>
-          <p:cNvSpPr>
-            <a:spLocks noGrp="1" noRot="1" noChangeAspect="1"/>
-          </p:cNvSpPr>
-          <p:nvPr>
-            <p:ph type="sldImg"/>
-          </p:nvPr>
-        </p:nvSpPr>
-        <p:spPr/>
-      </p:sp>
-      <p:sp>
-        <p:nvSpPr>
-          <p:cNvPr id="3" name="Notes Placeholder 2"/>
-          <p:cNvSpPr>
-            <a:spLocks noGrp="1"/>
-          </p:cNvSpPr>
-          <p:nvPr>
-            <p:ph type="body" idx="1"/>
-          </p:nvPr>
-        </p:nvSpPr>
-        <p:spPr/>
-        <p:txBody>
-          <a:bodyPr/>
-          <a:lstStyle/>
-          <a:p>
-            <a:endParaRPr lang="en-US" dirty="0"/>
-          </a:p>
-        </p:txBody>
-      </p:sp>
-      <p:sp>
-        <p:nvSpPr>
-          <p:cNvPr id="4" name="Slide Number Placeholder 3"/>
-          <p:cNvSpPr>
-            <a:spLocks noGrp="1"/>
-          </p:cNvSpPr>
-          <p:nvPr>
-            <p:ph type="sldNum" sz="quarter" idx="5"/>
-          </p:nvPr>
-        </p:nvSpPr>
-        <p:spPr/>
-        <p:txBody>
-          <a:bodyPr/>
-          <a:lstStyle/>
-          <a:p>
-            <a:fld id="{22289C57-55D7-40A4-A101-E74FAC7A092B}" type="slidenum">
-              <a:rPr lang="en-US" smtClean="0"/>
-              <a:t>13</a:t>
-            </a:fld>
-            <a:endParaRPr lang="en-US" dirty="0"/>
-          </a:p>
-        </p:txBody>
-      </p:sp>
-    </p:spTree>
-    <p:extLst>
-      <p:ext uri="{BB962C8B-B14F-4D97-AF65-F5344CB8AC3E}">
-        <p14:creationId xmlns:p14="http://schemas.microsoft.com/office/powerpoint/2010/main" val="702683811"/>
-      </p:ext>
-    </p:extLst>
-  </p:cSld>
-  <p:clrMapOvr>
-    <a:masterClrMapping/>
-  </p:clrMapOvr>
-</p:notes>
-</file>
-
 <file path=ppt/notesSlides/notesSlide2.xml><?xml version="1.0" encoding="utf-8"?>
 <p:notes xmlns:a="http://schemas.openxmlformats.org/drawingml/2006/main" xmlns:r="http://schemas.openxmlformats.org/officeDocument/2006/relationships" xmlns:p="http://schemas.openxmlformats.org/presentationml/2006/main">
   <p:cSld>
@@ -1408,7 +1073,7 @@
           <a:p>
             <a:fld id="{22289C57-55D7-40A4-A101-E74FAC7A092B}" type="slidenum">
               <a:rPr lang="en-US" smtClean="0"/>
-              <a:t>5</a:t>
+              <a:t>6</a:t>
             </a:fld>
             <a:endParaRPr lang="en-US" dirty="0"/>
           </a:p>
@@ -1492,7 +1157,7 @@
           <a:p>
             <a:fld id="{22289C57-55D7-40A4-A101-E74FAC7A092B}" type="slidenum">
               <a:rPr lang="en-US" smtClean="0"/>
-              <a:t>6</a:t>
+              <a:t>10</a:t>
             </a:fld>
             <a:endParaRPr lang="en-US" dirty="0"/>
           </a:p>
@@ -1576,7 +1241,7 @@
           <a:p>
             <a:fld id="{22289C57-55D7-40A4-A101-E74FAC7A092B}" type="slidenum">
               <a:rPr lang="en-US" smtClean="0"/>
-              <a:t>7</a:t>
+              <a:t>14</a:t>
             </a:fld>
             <a:endParaRPr lang="en-US" dirty="0"/>
           </a:p>
@@ -1585,175 +1250,7 @@
     </p:spTree>
     <p:extLst>
       <p:ext uri="{BB962C8B-B14F-4D97-AF65-F5344CB8AC3E}">
-        <p14:creationId xmlns:p14="http://schemas.microsoft.com/office/powerpoint/2010/main" val="1025326889"/>
-      </p:ext>
-    </p:extLst>
-  </p:cSld>
-  <p:clrMapOvr>
-    <a:masterClrMapping/>
-  </p:clrMapOvr>
-</p:notes>
-</file>
-
-<file path=ppt/notesSlides/notesSlide8.xml><?xml version="1.0" encoding="utf-8"?>
-<p:notes xmlns:a="http://schemas.openxmlformats.org/drawingml/2006/main" xmlns:r="http://schemas.openxmlformats.org/officeDocument/2006/relationships" xmlns:p="http://schemas.openxmlformats.org/presentationml/2006/main">
-  <p:cSld>
-    <p:spTree>
-      <p:nvGrpSpPr>
-        <p:cNvPr id="1" name=""/>
-        <p:cNvGrpSpPr/>
-        <p:nvPr/>
-      </p:nvGrpSpPr>
-      <p:grpSpPr>
-        <a:xfrm>
-          <a:off x="0" y="0"/>
-          <a:ext cx="0" cy="0"/>
-          <a:chOff x="0" y="0"/>
-          <a:chExt cx="0" cy="0"/>
-        </a:xfrm>
-      </p:grpSpPr>
-      <p:sp>
-        <p:nvSpPr>
-          <p:cNvPr id="2" name="Slide Image Placeholder 1"/>
-          <p:cNvSpPr>
-            <a:spLocks noGrp="1" noRot="1" noChangeAspect="1"/>
-          </p:cNvSpPr>
-          <p:nvPr>
-            <p:ph type="sldImg"/>
-          </p:nvPr>
-        </p:nvSpPr>
-        <p:spPr/>
-      </p:sp>
-      <p:sp>
-        <p:nvSpPr>
-          <p:cNvPr id="3" name="Notes Placeholder 2"/>
-          <p:cNvSpPr>
-            <a:spLocks noGrp="1"/>
-          </p:cNvSpPr>
-          <p:nvPr>
-            <p:ph type="body" idx="1"/>
-          </p:nvPr>
-        </p:nvSpPr>
-        <p:spPr/>
-        <p:txBody>
-          <a:bodyPr/>
-          <a:lstStyle/>
-          <a:p>
-            <a:endParaRPr lang="en-US" dirty="0"/>
-          </a:p>
-        </p:txBody>
-      </p:sp>
-      <p:sp>
-        <p:nvSpPr>
-          <p:cNvPr id="4" name="Slide Number Placeholder 3"/>
-          <p:cNvSpPr>
-            <a:spLocks noGrp="1"/>
-          </p:cNvSpPr>
-          <p:nvPr>
-            <p:ph type="sldNum" sz="quarter" idx="5"/>
-          </p:nvPr>
-        </p:nvSpPr>
-        <p:spPr/>
-        <p:txBody>
-          <a:bodyPr/>
-          <a:lstStyle/>
-          <a:p>
-            <a:fld id="{22289C57-55D7-40A4-A101-E74FAC7A092B}" type="slidenum">
-              <a:rPr lang="en-US" smtClean="0"/>
-              <a:t>8</a:t>
-            </a:fld>
-            <a:endParaRPr lang="en-US" dirty="0"/>
-          </a:p>
-        </p:txBody>
-      </p:sp>
-    </p:spTree>
-    <p:extLst>
-      <p:ext uri="{BB962C8B-B14F-4D97-AF65-F5344CB8AC3E}">
-        <p14:creationId xmlns:p14="http://schemas.microsoft.com/office/powerpoint/2010/main" val="236659336"/>
-      </p:ext>
-    </p:extLst>
-  </p:cSld>
-  <p:clrMapOvr>
-    <a:masterClrMapping/>
-  </p:clrMapOvr>
-</p:notes>
-</file>
-
-<file path=ppt/notesSlides/notesSlide9.xml><?xml version="1.0" encoding="utf-8"?>
-<p:notes xmlns:a="http://schemas.openxmlformats.org/drawingml/2006/main" xmlns:r="http://schemas.openxmlformats.org/officeDocument/2006/relationships" xmlns:p="http://schemas.openxmlformats.org/presentationml/2006/main">
-  <p:cSld>
-    <p:spTree>
-      <p:nvGrpSpPr>
-        <p:cNvPr id="1" name=""/>
-        <p:cNvGrpSpPr/>
-        <p:nvPr/>
-      </p:nvGrpSpPr>
-      <p:grpSpPr>
-        <a:xfrm>
-          <a:off x="0" y="0"/>
-          <a:ext cx="0" cy="0"/>
-          <a:chOff x="0" y="0"/>
-          <a:chExt cx="0" cy="0"/>
-        </a:xfrm>
-      </p:grpSpPr>
-      <p:sp>
-        <p:nvSpPr>
-          <p:cNvPr id="2" name="Slide Image Placeholder 1"/>
-          <p:cNvSpPr>
-            <a:spLocks noGrp="1" noRot="1" noChangeAspect="1"/>
-          </p:cNvSpPr>
-          <p:nvPr>
-            <p:ph type="sldImg"/>
-          </p:nvPr>
-        </p:nvSpPr>
-        <p:spPr/>
-      </p:sp>
-      <p:sp>
-        <p:nvSpPr>
-          <p:cNvPr id="3" name="Notes Placeholder 2"/>
-          <p:cNvSpPr>
-            <a:spLocks noGrp="1"/>
-          </p:cNvSpPr>
-          <p:nvPr>
-            <p:ph type="body" idx="1"/>
-          </p:nvPr>
-        </p:nvSpPr>
-        <p:spPr/>
-        <p:txBody>
-          <a:bodyPr/>
-          <a:lstStyle/>
-          <a:p>
-            <a:endParaRPr lang="en-US" dirty="0"/>
-          </a:p>
-        </p:txBody>
-      </p:sp>
-      <p:sp>
-        <p:nvSpPr>
-          <p:cNvPr id="4" name="Slide Number Placeholder 3"/>
-          <p:cNvSpPr>
-            <a:spLocks noGrp="1"/>
-          </p:cNvSpPr>
-          <p:nvPr>
-            <p:ph type="sldNum" sz="quarter" idx="5"/>
-          </p:nvPr>
-        </p:nvSpPr>
-        <p:spPr/>
-        <p:txBody>
-          <a:bodyPr/>
-          <a:lstStyle/>
-          <a:p>
-            <a:fld id="{22289C57-55D7-40A4-A101-E74FAC7A092B}" type="slidenum">
-              <a:rPr lang="en-US" smtClean="0"/>
-              <a:t>9</a:t>
-            </a:fld>
-            <a:endParaRPr lang="en-US" dirty="0"/>
-          </a:p>
-        </p:txBody>
-      </p:sp>
-    </p:spTree>
-    <p:extLst>
-      <p:ext uri="{BB962C8B-B14F-4D97-AF65-F5344CB8AC3E}">
-        <p14:creationId xmlns:p14="http://schemas.microsoft.com/office/powerpoint/2010/main" val="3105683219"/>
+        <p14:creationId xmlns:p14="http://schemas.microsoft.com/office/powerpoint/2010/main" val="702683811"/>
       </p:ext>
     </p:extLst>
   </p:cSld>
@@ -7196,570 +6693,49 @@
       </p:grpSpPr>
       <p:sp>
         <p:nvSpPr>
-          <p:cNvPr id="3" name="Title 2">
-            <a:extLst>
-              <a:ext uri="{FF2B5EF4-FFF2-40B4-BE49-F238E27FC236}">
-                <a16:creationId xmlns:a16="http://schemas.microsoft.com/office/drawing/2014/main" id="{4321055C-5E33-5D21-2A6E-21827FA88ED3}"/>
-              </a:ext>
-            </a:extLst>
-          </p:cNvPr>
-          <p:cNvSpPr>
-            <a:spLocks noGrp="1"/>
-          </p:cNvSpPr>
-          <p:nvPr>
-            <p:ph type="title"/>
+          <p:cNvPr id="2" name="Title 1">
+            <a:extLst>
+              <a:ext uri="{FF2B5EF4-FFF2-40B4-BE49-F238E27FC236}">
+                <a16:creationId xmlns:a16="http://schemas.microsoft.com/office/drawing/2014/main" id="{566C97BE-403B-122E-90D1-2788978A0B6F}"/>
+              </a:ext>
+            </a:extLst>
+          </p:cNvPr>
+          <p:cNvSpPr>
+            <a:spLocks noGrp="1"/>
+          </p:cNvSpPr>
+          <p:nvPr>
+            <p:ph type="ctrTitle"/>
           </p:nvPr>
         </p:nvSpPr>
         <p:spPr>
           <a:xfrm>
-            <a:off x="838201" y="895350"/>
-            <a:ext cx="3247662" cy="1917700"/>
+            <a:off x="6991350" y="406400"/>
+            <a:ext cx="4179570" cy="3457971"/>
           </a:xfrm>
         </p:spPr>
         <p:txBody>
-          <a:bodyPr>
-            <a:normAutofit/>
-          </a:bodyPr>
+          <a:bodyPr/>
           <a:lstStyle/>
           <a:p>
             <a:r>
-              <a:rPr lang="en-US" dirty="0"/>
-              <a:t>Dynamic </a:t>
+              <a:rPr lang="en-US" sz="2800" dirty="0"/>
+              <a:t>Interactive Activity</a:t>
             </a:r>
             <a:br>
               <a:rPr lang="en-US" dirty="0"/>
             </a:br>
             <a:r>
-              <a:rPr lang="en-US" dirty="0"/>
-              <a:t>delivery</a:t>
-            </a:r>
-          </a:p>
-        </p:txBody>
-      </p:sp>
-      <p:sp>
-        <p:nvSpPr>
-          <p:cNvPr id="6" name="Text Placeholder 5">
-            <a:extLst>
-              <a:ext uri="{FF2B5EF4-FFF2-40B4-BE49-F238E27FC236}">
-                <a16:creationId xmlns:a16="http://schemas.microsoft.com/office/drawing/2014/main" id="{B587B122-1579-FDB8-443B-F05E622163C3}"/>
-              </a:ext>
-            </a:extLst>
-          </p:cNvPr>
-          <p:cNvSpPr>
-            <a:spLocks noGrp="1"/>
-          </p:cNvSpPr>
-          <p:nvPr>
-            <p:ph sz="half" idx="16"/>
-          </p:nvPr>
-        </p:nvSpPr>
-        <p:spPr>
-          <a:xfrm>
-            <a:off x="838200" y="2813049"/>
-            <a:ext cx="3247662" cy="3238499"/>
-          </a:xfrm>
-        </p:spPr>
-        <p:txBody>
-          <a:bodyPr>
-            <a:normAutofit/>
-          </a:bodyPr>
-          <a:lstStyle/>
-          <a:p>
-            <a:r>
-              <a:rPr lang="en-US"/>
-              <a:t>Learn to infuse energy into your delivery to leave a lasting impression</a:t>
-            </a:r>
-          </a:p>
-          <a:p>
-            <a:r>
-              <a:rPr lang="en-US"/>
-              <a:t>One of the goals of effective communication is to motivate your audience</a:t>
-            </a:r>
-            <a:endParaRPr lang="en-US" dirty="0"/>
-          </a:p>
-        </p:txBody>
-      </p:sp>
-      <p:graphicFrame>
-        <p:nvGraphicFramePr>
-          <p:cNvPr id="10" name="Table Placeholder 2">
-            <a:extLst>
-              <a:ext uri="{FF2B5EF4-FFF2-40B4-BE49-F238E27FC236}">
-                <a16:creationId xmlns:a16="http://schemas.microsoft.com/office/drawing/2014/main" id="{98ED67AF-B48B-F5F8-E2FD-1C98C42C4D54}"/>
-              </a:ext>
-            </a:extLst>
-          </p:cNvPr>
-          <p:cNvGraphicFramePr>
-            <a:graphicFrameLocks noGrp="1"/>
-          </p:cNvGraphicFramePr>
-          <p:nvPr>
-            <p:ph type="tbl" sz="quarter" idx="14"/>
-            <p:extLst>
-              <p:ext uri="{D42A27DB-BD31-4B8C-83A1-F6EECF244321}">
-                <p14:modId xmlns:p14="http://schemas.microsoft.com/office/powerpoint/2010/main" val="774504910"/>
-              </p:ext>
-            </p:extLst>
-          </p:nvPr>
-        </p:nvGraphicFramePr>
-        <p:xfrm>
-          <a:off x="4216400" y="895350"/>
-          <a:ext cx="7137404" cy="5115889"/>
-        </p:xfrm>
-        <a:graphic>
-          <a:graphicData uri="http://schemas.openxmlformats.org/drawingml/2006/table">
-            <a:tbl>
-              <a:tblPr firstRow="1" bandRow="1">
-                <a:tableStyleId>{7E9639D4-E3E2-4D34-9284-5A2195B3D0D7}</a:tableStyleId>
-              </a:tblPr>
-              <a:tblGrid>
-                <a:gridCol w="1784351">
-                  <a:extLst>
-                    <a:ext uri="{9D8B030D-6E8A-4147-A177-3AD203B41FA5}">
-                      <a16:colId xmlns:a16="http://schemas.microsoft.com/office/drawing/2014/main" val="127040821"/>
-                    </a:ext>
-                  </a:extLst>
-                </a:gridCol>
-                <a:gridCol w="1784351">
-                  <a:extLst>
-                    <a:ext uri="{9D8B030D-6E8A-4147-A177-3AD203B41FA5}">
-                      <a16:colId xmlns:a16="http://schemas.microsoft.com/office/drawing/2014/main" val="149845700"/>
-                    </a:ext>
-                  </a:extLst>
-                </a:gridCol>
-                <a:gridCol w="1784351">
-                  <a:extLst>
-                    <a:ext uri="{9D8B030D-6E8A-4147-A177-3AD203B41FA5}">
-                      <a16:colId xmlns:a16="http://schemas.microsoft.com/office/drawing/2014/main" val="3119692462"/>
-                    </a:ext>
-                  </a:extLst>
-                </a:gridCol>
-                <a:gridCol w="1784351">
-                  <a:extLst>
-                    <a:ext uri="{9D8B030D-6E8A-4147-A177-3AD203B41FA5}">
-                      <a16:colId xmlns:a16="http://schemas.microsoft.com/office/drawing/2014/main" val="3472639139"/>
-                    </a:ext>
-                  </a:extLst>
-                </a:gridCol>
-              </a:tblGrid>
-              <a:tr h="810285">
-                <a:tc>
-                  <a:txBody>
-                    <a:bodyPr/>
-                    <a:lstStyle/>
-                    <a:p>
-                      <a:pPr algn="ctr"/>
-                      <a:r>
-                        <a:rPr lang="en-US" b="0" dirty="0"/>
-                        <a:t>METRIC</a:t>
-                      </a:r>
-                    </a:p>
-                  </a:txBody>
-                  <a:tcPr anchor="ctr"/>
-                </a:tc>
-                <a:tc>
-                  <a:txBody>
-                    <a:bodyPr/>
-                    <a:lstStyle/>
-                    <a:p>
-                      <a:pPr algn="ctr"/>
-                      <a:r>
-                        <a:rPr lang="en-US" b="0" dirty="0"/>
-                        <a:t>MEASUREMENT</a:t>
-                      </a:r>
-                    </a:p>
-                  </a:txBody>
-                  <a:tcPr anchor="ctr"/>
-                </a:tc>
-                <a:tc>
-                  <a:txBody>
-                    <a:bodyPr/>
-                    <a:lstStyle/>
-                    <a:p>
-                      <a:pPr algn="ctr"/>
-                      <a:r>
-                        <a:rPr lang="en-US" b="0" dirty="0"/>
-                        <a:t>TARGET</a:t>
-                      </a:r>
-                    </a:p>
-                  </a:txBody>
-                  <a:tcPr anchor="ctr"/>
-                </a:tc>
-                <a:tc>
-                  <a:txBody>
-                    <a:bodyPr/>
-                    <a:lstStyle/>
-                    <a:p>
-                      <a:pPr algn="ctr"/>
-                      <a:r>
-                        <a:rPr lang="en-US" b="0" dirty="0"/>
-                        <a:t>ACTUAL</a:t>
-                      </a:r>
-                    </a:p>
-                  </a:txBody>
-                  <a:tcPr anchor="ctr"/>
-                </a:tc>
-                <a:extLst>
-                  <a:ext uri="{0D108BD9-81ED-4DB2-BD59-A6C34878D82A}">
-                    <a16:rowId xmlns:a16="http://schemas.microsoft.com/office/drawing/2014/main" val="3298013591"/>
-                  </a:ext>
-                </a:extLst>
-              </a:tr>
-              <a:tr h="839540">
-                <a:tc>
-                  <a:txBody>
-                    <a:bodyPr/>
-                    <a:lstStyle/>
-                    <a:p>
-                      <a:pPr algn="ctr"/>
-                      <a:r>
-                        <a:rPr lang="en-US" dirty="0"/>
-                        <a:t>Audience attendance</a:t>
-                      </a:r>
-                    </a:p>
-                  </a:txBody>
-                  <a:tcPr anchor="ctr"/>
-                </a:tc>
-                <a:tc>
-                  <a:txBody>
-                    <a:bodyPr/>
-                    <a:lstStyle/>
-                    <a:p>
-                      <a:pPr algn="ctr"/>
-                      <a:r>
-                        <a:rPr lang="en-US" dirty="0"/>
-                        <a:t># of attendees</a:t>
-                      </a:r>
-                    </a:p>
-                  </a:txBody>
-                  <a:tcPr anchor="ctr"/>
-                </a:tc>
-                <a:tc>
-                  <a:txBody>
-                    <a:bodyPr/>
-                    <a:lstStyle/>
-                    <a:p>
-                      <a:pPr algn="ctr"/>
-                      <a:r>
-                        <a:rPr lang="en-US" dirty="0"/>
-                        <a:t>150</a:t>
-                      </a:r>
-                    </a:p>
-                  </a:txBody>
-                  <a:tcPr anchor="ctr"/>
-                </a:tc>
-                <a:tc>
-                  <a:txBody>
-                    <a:bodyPr/>
-                    <a:lstStyle/>
-                    <a:p>
-                      <a:pPr algn="ctr"/>
-                      <a:r>
-                        <a:rPr lang="en-US" dirty="0"/>
-                        <a:t>120</a:t>
-                      </a:r>
-                    </a:p>
-                  </a:txBody>
-                  <a:tcPr anchor="ctr"/>
-                </a:tc>
-                <a:extLst>
-                  <a:ext uri="{0D108BD9-81ED-4DB2-BD59-A6C34878D82A}">
-                    <a16:rowId xmlns:a16="http://schemas.microsoft.com/office/drawing/2014/main" val="3873867931"/>
-                  </a:ext>
-                </a:extLst>
-              </a:tr>
-              <a:tr h="839540">
-                <a:tc>
-                  <a:txBody>
-                    <a:bodyPr/>
-                    <a:lstStyle/>
-                    <a:p>
-                      <a:pPr algn="ctr"/>
-                      <a:r>
-                        <a:rPr lang="en-US" dirty="0"/>
-                        <a:t>Engagement duration</a:t>
-                      </a:r>
-                    </a:p>
-                  </a:txBody>
-                  <a:tcPr anchor="ctr"/>
-                </a:tc>
-                <a:tc>
-                  <a:txBody>
-                    <a:bodyPr/>
-                    <a:lstStyle/>
-                    <a:p>
-                      <a:pPr algn="ctr"/>
-                      <a:r>
-                        <a:rPr lang="en-US" dirty="0"/>
-                        <a:t>Minutes</a:t>
-                      </a:r>
-                    </a:p>
-                  </a:txBody>
-                  <a:tcPr anchor="ctr"/>
-                </a:tc>
-                <a:tc>
-                  <a:txBody>
-                    <a:bodyPr/>
-                    <a:lstStyle/>
-                    <a:p>
-                      <a:pPr algn="ctr"/>
-                      <a:r>
-                        <a:rPr lang="en-US" dirty="0"/>
-                        <a:t>60</a:t>
-                      </a:r>
-                    </a:p>
-                  </a:txBody>
-                  <a:tcPr anchor="ctr"/>
-                </a:tc>
-                <a:tc>
-                  <a:txBody>
-                    <a:bodyPr/>
-                    <a:lstStyle/>
-                    <a:p>
-                      <a:pPr algn="ctr"/>
-                      <a:r>
-                        <a:rPr lang="en-US" dirty="0"/>
-                        <a:t>75</a:t>
-                      </a:r>
-                    </a:p>
-                  </a:txBody>
-                  <a:tcPr anchor="ctr"/>
-                </a:tc>
-                <a:extLst>
-                  <a:ext uri="{0D108BD9-81ED-4DB2-BD59-A6C34878D82A}">
-                    <a16:rowId xmlns:a16="http://schemas.microsoft.com/office/drawing/2014/main" val="85209771"/>
-                  </a:ext>
-                </a:extLst>
-              </a:tr>
-              <a:tr h="587640">
-                <a:tc>
-                  <a:txBody>
-                    <a:bodyPr/>
-                    <a:lstStyle/>
-                    <a:p>
-                      <a:pPr algn="ctr"/>
-                      <a:r>
-                        <a:rPr lang="en-US" dirty="0"/>
-                        <a:t>Q&amp;A interaction</a:t>
-                      </a:r>
-                    </a:p>
-                  </a:txBody>
-                  <a:tcPr anchor="ctr"/>
-                </a:tc>
-                <a:tc>
-                  <a:txBody>
-                    <a:bodyPr/>
-                    <a:lstStyle/>
-                    <a:p>
-                      <a:pPr algn="ctr"/>
-                      <a:r>
-                        <a:rPr lang="en-US" dirty="0"/>
-                        <a:t># of questions</a:t>
-                      </a:r>
-                    </a:p>
-                  </a:txBody>
-                  <a:tcPr anchor="ctr"/>
-                </a:tc>
-                <a:tc>
-                  <a:txBody>
-                    <a:bodyPr/>
-                    <a:lstStyle/>
-                    <a:p>
-                      <a:pPr algn="ctr"/>
-                      <a:r>
-                        <a:rPr lang="en-US" dirty="0"/>
-                        <a:t>10</a:t>
-                      </a:r>
-                    </a:p>
-                  </a:txBody>
-                  <a:tcPr anchor="ctr"/>
-                </a:tc>
-                <a:tc>
-                  <a:txBody>
-                    <a:bodyPr/>
-                    <a:lstStyle/>
-                    <a:p>
-                      <a:pPr algn="ctr"/>
-                      <a:r>
-                        <a:rPr lang="en-US" dirty="0"/>
-                        <a:t>15</a:t>
-                      </a:r>
-                    </a:p>
-                  </a:txBody>
-                  <a:tcPr anchor="ctr"/>
-                </a:tc>
-                <a:extLst>
-                  <a:ext uri="{0D108BD9-81ED-4DB2-BD59-A6C34878D82A}">
-                    <a16:rowId xmlns:a16="http://schemas.microsoft.com/office/drawing/2014/main" val="4061031278"/>
-                  </a:ext>
-                </a:extLst>
-              </a:tr>
-              <a:tr h="839540">
-                <a:tc>
-                  <a:txBody>
-                    <a:bodyPr/>
-                    <a:lstStyle/>
-                    <a:p>
-                      <a:pPr algn="ctr"/>
-                      <a:r>
-                        <a:rPr lang="en-US" dirty="0"/>
-                        <a:t>Positive feedback</a:t>
-                      </a:r>
-                    </a:p>
-                  </a:txBody>
-                  <a:tcPr anchor="ctr"/>
-                </a:tc>
-                <a:tc>
-                  <a:txBody>
-                    <a:bodyPr/>
-                    <a:lstStyle/>
-                    <a:p>
-                      <a:pPr algn="ctr"/>
-                      <a:r>
-                        <a:rPr lang="en-US" dirty="0"/>
-                        <a:t>Percentage (%)</a:t>
-                      </a:r>
-                    </a:p>
-                  </a:txBody>
-                  <a:tcPr anchor="ctr"/>
-                </a:tc>
-                <a:tc>
-                  <a:txBody>
-                    <a:bodyPr/>
-                    <a:lstStyle/>
-                    <a:p>
-                      <a:pPr algn="ctr"/>
-                      <a:r>
-                        <a:rPr lang="en-US" dirty="0"/>
-                        <a:t>90</a:t>
-                      </a:r>
-                    </a:p>
-                  </a:txBody>
-                  <a:tcPr anchor="ctr"/>
-                </a:tc>
-                <a:tc>
-                  <a:txBody>
-                    <a:bodyPr/>
-                    <a:lstStyle/>
-                    <a:p>
-                      <a:pPr algn="ctr"/>
-                      <a:r>
-                        <a:rPr lang="en-US" dirty="0"/>
-                        <a:t>95</a:t>
-                      </a:r>
-                    </a:p>
-                  </a:txBody>
-                  <a:tcPr anchor="ctr"/>
-                </a:tc>
-                <a:extLst>
-                  <a:ext uri="{0D108BD9-81ED-4DB2-BD59-A6C34878D82A}">
-                    <a16:rowId xmlns:a16="http://schemas.microsoft.com/office/drawing/2014/main" val="3591840781"/>
-                  </a:ext>
-                </a:extLst>
-              </a:tr>
-              <a:tr h="1199344">
-                <a:tc>
-                  <a:txBody>
-                    <a:bodyPr/>
-                    <a:lstStyle/>
-                    <a:p>
-                      <a:pPr algn="ctr"/>
-                      <a:r>
-                        <a:rPr lang="en-US" dirty="0"/>
-                        <a:t>Rate of information retention</a:t>
-                      </a:r>
-                    </a:p>
-                  </a:txBody>
-                  <a:tcPr anchor="ctr"/>
-                </a:tc>
-                <a:tc>
-                  <a:txBody>
-                    <a:bodyPr/>
-                    <a:lstStyle/>
-                    <a:p>
-                      <a:pPr algn="ctr"/>
-                      <a:r>
-                        <a:rPr lang="en-US" dirty="0"/>
-                        <a:t>Percentage (%)</a:t>
-                      </a:r>
-                    </a:p>
-                  </a:txBody>
-                  <a:tcPr anchor="ctr"/>
-                </a:tc>
-                <a:tc>
-                  <a:txBody>
-                    <a:bodyPr/>
-                    <a:lstStyle/>
-                    <a:p>
-                      <a:pPr algn="ctr"/>
-                      <a:r>
-                        <a:rPr lang="en-US" dirty="0"/>
-                        <a:t>80</a:t>
-                      </a:r>
-                    </a:p>
-                  </a:txBody>
-                  <a:tcPr anchor="ctr"/>
-                </a:tc>
-                <a:tc>
-                  <a:txBody>
-                    <a:bodyPr/>
-                    <a:lstStyle/>
-                    <a:p>
-                      <a:pPr algn="ctr"/>
-                      <a:r>
-                        <a:rPr lang="en-US" dirty="0"/>
-                        <a:t>85</a:t>
-                      </a:r>
-                    </a:p>
-                  </a:txBody>
-                  <a:tcPr anchor="ctr"/>
-                </a:tc>
-                <a:extLst>
-                  <a:ext uri="{0D108BD9-81ED-4DB2-BD59-A6C34878D82A}">
-                    <a16:rowId xmlns:a16="http://schemas.microsoft.com/office/drawing/2014/main" val="335389741"/>
-                  </a:ext>
-                </a:extLst>
-              </a:tr>
-            </a:tbl>
-          </a:graphicData>
-        </a:graphic>
-      </p:graphicFrame>
-      <p:sp>
-        <p:nvSpPr>
-          <p:cNvPr id="5" name="Slide Number Placeholder 4">
-            <a:extLst>
-              <a:ext uri="{FF2B5EF4-FFF2-40B4-BE49-F238E27FC236}">
-                <a16:creationId xmlns:a16="http://schemas.microsoft.com/office/drawing/2014/main" id="{E74B0ADB-527F-A58C-9372-D8502ED6F918}"/>
-              </a:ext>
-            </a:extLst>
-          </p:cNvPr>
-          <p:cNvSpPr>
-            <a:spLocks noGrp="1"/>
-          </p:cNvSpPr>
-          <p:nvPr>
-            <p:ph type="sldNum" sz="quarter" idx="12"/>
-          </p:nvPr>
-        </p:nvSpPr>
-        <p:spPr>
-          <a:xfrm>
-            <a:off x="10373350" y="6356349"/>
-            <a:ext cx="987552" cy="365125"/>
-          </a:xfrm>
-        </p:spPr>
-        <p:txBody>
-          <a:bodyPr/>
-          <a:lstStyle/>
-          <a:p>
-            <a:fld id="{A49DFD55-3C28-40EF-9E31-A92D2E4017FF}" type="slidenum">
-              <a:rPr lang="en-US" smtClean="0"/>
-              <a:pPr/>
-              <a:t>10</a:t>
-            </a:fld>
-            <a:endParaRPr lang="en-US" dirty="0"/>
+              <a:rPr lang="en-US" b="1" u="sng" dirty="0" err="1"/>
+              <a:t>SQLBolt</a:t>
+            </a:r>
+            <a:endParaRPr lang="en-US" b="1" u="sng" dirty="0"/>
           </a:p>
         </p:txBody>
       </p:sp>
     </p:spTree>
     <p:extLst>
       <p:ext uri="{BB962C8B-B14F-4D97-AF65-F5344CB8AC3E}">
-        <p14:creationId xmlns:p14="http://schemas.microsoft.com/office/powerpoint/2010/main" val="1658164610"/>
+        <p14:creationId xmlns:p14="http://schemas.microsoft.com/office/powerpoint/2010/main" val="334696707"/>
       </p:ext>
     </p:extLst>
   </p:cSld>
@@ -7788,285 +6764,61 @@
       </p:grpSpPr>
       <p:sp>
         <p:nvSpPr>
-          <p:cNvPr id="17" name="Title 1">
-            <a:extLst>
-              <a:ext uri="{FF2B5EF4-FFF2-40B4-BE49-F238E27FC236}">
-                <a16:creationId xmlns:a16="http://schemas.microsoft.com/office/drawing/2014/main" id="{09140014-73D5-419B-8867-972BB18D52D4}"/>
-              </a:ext>
-            </a:extLst>
-          </p:cNvPr>
-          <p:cNvSpPr>
-            <a:spLocks noGrp="1"/>
-          </p:cNvSpPr>
-          <p:nvPr>
-            <p:ph type="title"/>
-          </p:nvPr>
-        </p:nvSpPr>
-        <p:spPr>
-          <a:xfrm>
-            <a:off x="838200" y="337192"/>
-            <a:ext cx="5655197" cy="1997867"/>
-          </a:xfrm>
-        </p:spPr>
-        <p:txBody>
-          <a:bodyPr anchor="b"/>
-          <a:lstStyle/>
-          <a:p>
-            <a:r>
-              <a:rPr lang="en-US" dirty="0"/>
-              <a:t>Final tips &amp; takeaways</a:t>
-            </a:r>
-          </a:p>
-        </p:txBody>
-      </p:sp>
-      <p:sp>
-        <p:nvSpPr>
-          <p:cNvPr id="6" name="Text Placeholder 5">
-            <a:extLst>
-              <a:ext uri="{FF2B5EF4-FFF2-40B4-BE49-F238E27FC236}">
-                <a16:creationId xmlns:a16="http://schemas.microsoft.com/office/drawing/2014/main" id="{D2E1CF79-4FDC-8CAF-CC16-E309A2C49758}"/>
-              </a:ext>
-            </a:extLst>
-          </p:cNvPr>
-          <p:cNvSpPr>
-            <a:spLocks noGrp="1"/>
-          </p:cNvSpPr>
-          <p:nvPr>
-            <p:ph type="body" idx="1"/>
-          </p:nvPr>
-        </p:nvSpPr>
-        <p:spPr>
-          <a:xfrm>
-            <a:off x="838200" y="2705177"/>
-            <a:ext cx="5733772" cy="448990"/>
-          </a:xfrm>
-        </p:spPr>
+          <p:cNvPr id="2" name="Title 1">
+            <a:extLst>
+              <a:ext uri="{FF2B5EF4-FFF2-40B4-BE49-F238E27FC236}">
+                <a16:creationId xmlns:a16="http://schemas.microsoft.com/office/drawing/2014/main" id="{6CB84403-87E7-4805-1353-D4E02929ED69}"/>
+              </a:ext>
+            </a:extLst>
+          </p:cNvPr>
+          <p:cNvSpPr>
+            <a:spLocks noGrp="1"/>
+          </p:cNvSpPr>
+          <p:nvPr>
+            <p:ph type="ctrTitle"/>
+          </p:nvPr>
+        </p:nvSpPr>
+        <p:spPr/>
         <p:txBody>
           <a:bodyPr/>
           <a:lstStyle/>
           <a:p>
             <a:r>
-              <a:rPr lang="en-US" dirty="0"/>
-              <a:t>Practice makes perfect</a:t>
-            </a:r>
-          </a:p>
-        </p:txBody>
-      </p:sp>
-      <p:sp>
-        <p:nvSpPr>
-          <p:cNvPr id="20" name="Content Placeholder 3">
-            <a:extLst>
-              <a:ext uri="{FF2B5EF4-FFF2-40B4-BE49-F238E27FC236}">
-                <a16:creationId xmlns:a16="http://schemas.microsoft.com/office/drawing/2014/main" id="{33D8731E-4977-402E-8BFD-895B4D0544CC}"/>
-              </a:ext>
-            </a:extLst>
-          </p:cNvPr>
-          <p:cNvSpPr>
-            <a:spLocks noGrp="1"/>
-          </p:cNvSpPr>
-          <p:nvPr>
-            <p:ph sz="half" idx="2"/>
-          </p:nvPr>
-        </p:nvSpPr>
-        <p:spPr>
-          <a:xfrm>
-            <a:off x="838199" y="3154166"/>
-            <a:ext cx="5733773" cy="3032733"/>
-          </a:xfrm>
-        </p:spPr>
-        <p:txBody>
-          <a:bodyPr>
-            <a:noAutofit/>
-          </a:bodyPr>
-          <a:lstStyle/>
-          <a:p>
-            <a:r>
-              <a:rPr lang="en-US" dirty="0"/>
-              <a:t>Consistent rehearsal</a:t>
-            </a:r>
-          </a:p>
-          <a:p>
-            <a:pPr lvl="1"/>
-            <a:r>
-              <a:rPr lang="en-US" dirty="0"/>
-              <a:t>Strengthen your familiarity</a:t>
-            </a:r>
-          </a:p>
-          <a:p>
-            <a:r>
-              <a:rPr lang="en-US" dirty="0"/>
-              <a:t>Refine delivery style</a:t>
-            </a:r>
-          </a:p>
-          <a:p>
-            <a:pPr lvl="1"/>
-            <a:r>
-              <a:rPr lang="en-US" dirty="0"/>
-              <a:t>Pacing, tone, and emphasis</a:t>
-            </a:r>
-          </a:p>
-          <a:p>
-            <a:r>
-              <a:rPr lang="en-US" dirty="0"/>
-              <a:t>Timing and transitions</a:t>
-            </a:r>
-          </a:p>
-          <a:p>
-            <a:pPr lvl="1"/>
-            <a:r>
-              <a:rPr lang="en-US" dirty="0"/>
-              <a:t>Aim for seamless, professional delivery</a:t>
-            </a:r>
-          </a:p>
-          <a:p>
-            <a:r>
-              <a:rPr lang="en-US" dirty="0"/>
-              <a:t>Practice audience</a:t>
-            </a:r>
-          </a:p>
-          <a:p>
-            <a:pPr lvl="1"/>
-            <a:r>
-              <a:rPr lang="en-US" dirty="0"/>
-              <a:t>Enlist colleagues to listen &amp; provide feedback</a:t>
-            </a:r>
-          </a:p>
-          <a:p>
-            <a:endParaRPr lang="en-US" dirty="0"/>
-          </a:p>
-        </p:txBody>
-      </p:sp>
-      <p:sp>
-        <p:nvSpPr>
-          <p:cNvPr id="34" name="Text Placeholder 33">
-            <a:extLst>
-              <a:ext uri="{FF2B5EF4-FFF2-40B4-BE49-F238E27FC236}">
-                <a16:creationId xmlns:a16="http://schemas.microsoft.com/office/drawing/2014/main" id="{AE07A905-8B37-D13F-25D3-1D3BCDB86B0B}"/>
-              </a:ext>
-            </a:extLst>
-          </p:cNvPr>
-          <p:cNvSpPr>
-            <a:spLocks noGrp="1"/>
-          </p:cNvSpPr>
-          <p:nvPr>
-            <p:ph type="body" sz="quarter" idx="3"/>
-          </p:nvPr>
-        </p:nvSpPr>
-        <p:spPr>
-          <a:xfrm>
-            <a:off x="7887108" y="2705177"/>
-            <a:ext cx="3943627" cy="448989"/>
-          </a:xfrm>
-        </p:spPr>
+              <a:rPr lang="en-US" sz="2400" dirty="0"/>
+              <a:t>Follow-along activity</a:t>
+            </a:r>
+          </a:p>
+        </p:txBody>
+      </p:sp>
+      <p:sp>
+        <p:nvSpPr>
+          <p:cNvPr id="3" name="Picture Placeholder 2">
+            <a:extLst>
+              <a:ext uri="{FF2B5EF4-FFF2-40B4-BE49-F238E27FC236}">
+                <a16:creationId xmlns:a16="http://schemas.microsoft.com/office/drawing/2014/main" id="{4388391E-6322-7B50-6940-6CC36865420B}"/>
+              </a:ext>
+            </a:extLst>
+          </p:cNvPr>
+          <p:cNvSpPr>
+            <a:spLocks noGrp="1"/>
+          </p:cNvSpPr>
+          <p:nvPr>
+            <p:ph type="pic" sz="quarter" idx="10"/>
+          </p:nvPr>
+        </p:nvSpPr>
+        <p:spPr/>
         <p:txBody>
           <a:bodyPr/>
           <a:lstStyle/>
           <a:p>
-            <a:r>
-              <a:rPr lang="en-US" dirty="0"/>
-              <a:t>Continue improving</a:t>
-            </a:r>
-          </a:p>
-        </p:txBody>
-      </p:sp>
-      <p:sp>
-        <p:nvSpPr>
-          <p:cNvPr id="35" name="Content Placeholder 34">
-            <a:extLst>
-              <a:ext uri="{FF2B5EF4-FFF2-40B4-BE49-F238E27FC236}">
-                <a16:creationId xmlns:a16="http://schemas.microsoft.com/office/drawing/2014/main" id="{4E9A764F-6B65-050E-E561-82F77339D164}"/>
-              </a:ext>
-            </a:extLst>
-          </p:cNvPr>
-          <p:cNvSpPr>
-            <a:spLocks noGrp="1"/>
-          </p:cNvSpPr>
-          <p:nvPr>
-            <p:ph sz="half" idx="14"/>
-          </p:nvPr>
-        </p:nvSpPr>
-        <p:spPr>
-          <a:xfrm>
-            <a:off x="7887107" y="3164867"/>
-            <a:ext cx="3943627" cy="3032733"/>
-          </a:xfrm>
-        </p:spPr>
-        <p:txBody>
-          <a:bodyPr>
-            <a:normAutofit/>
-          </a:bodyPr>
-          <a:lstStyle/>
-          <a:p>
-            <a:r>
-              <a:rPr lang="en-US" dirty="0"/>
-              <a:t>Seek feedback</a:t>
-            </a:r>
-          </a:p>
-          <a:p>
-            <a:r>
-              <a:rPr lang="en-US" dirty="0"/>
-              <a:t>Reflect on performance</a:t>
-            </a:r>
-          </a:p>
-          <a:p>
-            <a:r>
-              <a:rPr lang="en-US" dirty="0"/>
-              <a:t>Explore new techniques</a:t>
-            </a:r>
-          </a:p>
-          <a:p>
-            <a:r>
-              <a:rPr lang="en-US" dirty="0"/>
-              <a:t>Set personal goals</a:t>
-            </a:r>
-          </a:p>
-          <a:p>
-            <a:r>
-              <a:rPr lang="en-US" dirty="0"/>
-              <a:t>Iterate and adapt</a:t>
-            </a:r>
-          </a:p>
-        </p:txBody>
-      </p:sp>
-      <p:sp>
-        <p:nvSpPr>
-          <p:cNvPr id="9" name="Slide Number Placeholder 8">
-            <a:extLst>
-              <a:ext uri="{FF2B5EF4-FFF2-40B4-BE49-F238E27FC236}">
-                <a16:creationId xmlns:a16="http://schemas.microsoft.com/office/drawing/2014/main" id="{C396FFDC-ADE8-4009-A466-A81787258E88}"/>
-              </a:ext>
-            </a:extLst>
-          </p:cNvPr>
-          <p:cNvSpPr>
-            <a:spLocks noGrp="1"/>
-          </p:cNvSpPr>
-          <p:nvPr>
-            <p:ph type="sldNum" sz="quarter" idx="12"/>
-          </p:nvPr>
-        </p:nvSpPr>
-        <p:spPr>
-          <a:xfrm>
-            <a:off x="8610600" y="6356350"/>
-            <a:ext cx="2743200" cy="365125"/>
-          </a:xfrm>
-        </p:spPr>
-        <p:txBody>
-          <a:bodyPr/>
-          <a:lstStyle/>
-          <a:p>
-            <a:fld id="{A49DFD55-3C28-40EF-9E31-A92D2E4017FF}" type="slidenum">
-              <a:rPr lang="en-US" smtClean="0"/>
-              <a:pPr/>
-              <a:t>11</a:t>
-            </a:fld>
-            <a:endParaRPr lang="en-US" dirty="0"/>
+            <a:endParaRPr lang="en-US"/>
           </a:p>
         </p:txBody>
       </p:sp>
     </p:spTree>
     <p:extLst>
       <p:ext uri="{BB962C8B-B14F-4D97-AF65-F5344CB8AC3E}">
-        <p14:creationId xmlns:p14="http://schemas.microsoft.com/office/powerpoint/2010/main" val="2403577982"/>
+        <p14:creationId xmlns:p14="http://schemas.microsoft.com/office/powerpoint/2010/main" val="2564342550"/>
       </p:ext>
     </p:extLst>
   </p:cSld>
@@ -8095,519 +6847,36 @@
       </p:grpSpPr>
       <p:sp>
         <p:nvSpPr>
-          <p:cNvPr id="8" name="Title 2">
-            <a:extLst>
-              <a:ext uri="{FF2B5EF4-FFF2-40B4-BE49-F238E27FC236}">
-                <a16:creationId xmlns:a16="http://schemas.microsoft.com/office/drawing/2014/main" id="{3E5FEE2D-79E5-4C1D-8BF7-EE619CA7039A}"/>
-              </a:ext>
-            </a:extLst>
-          </p:cNvPr>
-          <p:cNvSpPr>
-            <a:spLocks noGrp="1"/>
-          </p:cNvSpPr>
-          <p:nvPr>
-            <p:ph type="title"/>
-          </p:nvPr>
-        </p:nvSpPr>
-        <p:spPr>
-          <a:xfrm>
-            <a:off x="838200" y="353550"/>
-            <a:ext cx="10515600" cy="1325563"/>
-          </a:xfrm>
-        </p:spPr>
-        <p:txBody>
-          <a:bodyPr anchor="b"/>
-          <a:lstStyle/>
-          <a:p>
-            <a:r>
-              <a:rPr lang="en-US" dirty="0"/>
-              <a:t>Speaking engagement metrics</a:t>
-            </a:r>
-          </a:p>
-        </p:txBody>
-      </p:sp>
-      <p:graphicFrame>
-        <p:nvGraphicFramePr>
-          <p:cNvPr id="13" name="Table Placeholder 2">
-            <a:extLst>
-              <a:ext uri="{FF2B5EF4-FFF2-40B4-BE49-F238E27FC236}">
-                <a16:creationId xmlns:a16="http://schemas.microsoft.com/office/drawing/2014/main" id="{4A94C7BE-6E60-66F0-EFD4-2F452B0D743A}"/>
-              </a:ext>
-            </a:extLst>
-          </p:cNvPr>
-          <p:cNvGraphicFramePr>
-            <a:graphicFrameLocks noGrp="1"/>
-          </p:cNvGraphicFramePr>
-          <p:nvPr>
-            <p:ph type="tbl" sz="quarter" idx="14"/>
-            <p:extLst>
-              <p:ext uri="{D42A27DB-BD31-4B8C-83A1-F6EECF244321}">
-                <p14:modId xmlns:p14="http://schemas.microsoft.com/office/powerpoint/2010/main" val="1224246859"/>
-              </p:ext>
-            </p:extLst>
-          </p:nvPr>
-        </p:nvGraphicFramePr>
-        <p:xfrm>
-          <a:off x="838200" y="2111375"/>
-          <a:ext cx="10515601" cy="3570968"/>
-        </p:xfrm>
-        <a:graphic>
-          <a:graphicData uri="http://schemas.openxmlformats.org/drawingml/2006/table">
-            <a:tbl>
-              <a:tblPr firstRow="1" bandRow="1">
-                <a:tableStyleId>{7E9639D4-E3E2-4D34-9284-5A2195B3D0D7}</a:tableStyleId>
-              </a:tblPr>
-              <a:tblGrid>
-                <a:gridCol w="3433998">
-                  <a:extLst>
-                    <a:ext uri="{9D8B030D-6E8A-4147-A177-3AD203B41FA5}">
-                      <a16:colId xmlns:a16="http://schemas.microsoft.com/office/drawing/2014/main" val="127040821"/>
-                    </a:ext>
-                  </a:extLst>
-                </a:gridCol>
-                <a:gridCol w="2450892">
-                  <a:extLst>
-                    <a:ext uri="{9D8B030D-6E8A-4147-A177-3AD203B41FA5}">
-                      <a16:colId xmlns:a16="http://schemas.microsoft.com/office/drawing/2014/main" val="149845700"/>
-                    </a:ext>
-                  </a:extLst>
-                </a:gridCol>
-                <a:gridCol w="2375942">
-                  <a:extLst>
-                    <a:ext uri="{9D8B030D-6E8A-4147-A177-3AD203B41FA5}">
-                      <a16:colId xmlns:a16="http://schemas.microsoft.com/office/drawing/2014/main" val="3119692462"/>
-                    </a:ext>
-                  </a:extLst>
-                </a:gridCol>
-                <a:gridCol w="2254769">
-                  <a:extLst>
-                    <a:ext uri="{9D8B030D-6E8A-4147-A177-3AD203B41FA5}">
-                      <a16:colId xmlns:a16="http://schemas.microsoft.com/office/drawing/2014/main" val="3472639139"/>
-                    </a:ext>
-                  </a:extLst>
-                </a:gridCol>
-              </a:tblGrid>
-              <a:tr h="733347">
-                <a:tc>
-                  <a:txBody>
-                    <a:bodyPr/>
-                    <a:lstStyle/>
-                    <a:p>
-                      <a:pPr algn="ctr"/>
-                      <a:r>
-                        <a:rPr lang="en-US" b="0" dirty="0"/>
-                        <a:t>IMPACT FACTOR</a:t>
-                      </a:r>
-                    </a:p>
-                  </a:txBody>
-                  <a:tcPr anchor="ctr"/>
-                </a:tc>
-                <a:tc>
-                  <a:txBody>
-                    <a:bodyPr/>
-                    <a:lstStyle/>
-                    <a:p>
-                      <a:pPr algn="ctr"/>
-                      <a:r>
-                        <a:rPr lang="en-US" b="0" dirty="0"/>
-                        <a:t>MEASUREMENT</a:t>
-                      </a:r>
-                    </a:p>
-                  </a:txBody>
-                  <a:tcPr anchor="ctr"/>
-                </a:tc>
-                <a:tc>
-                  <a:txBody>
-                    <a:bodyPr/>
-                    <a:lstStyle/>
-                    <a:p>
-                      <a:pPr algn="ctr"/>
-                      <a:r>
-                        <a:rPr lang="en-US" b="0" dirty="0"/>
-                        <a:t>TARGET</a:t>
-                      </a:r>
-                    </a:p>
-                  </a:txBody>
-                  <a:tcPr anchor="ctr"/>
-                </a:tc>
-                <a:tc>
-                  <a:txBody>
-                    <a:bodyPr/>
-                    <a:lstStyle/>
-                    <a:p>
-                      <a:pPr algn="ctr"/>
-                      <a:r>
-                        <a:rPr lang="en-US" b="0" dirty="0"/>
-                        <a:t>ACHIEVED</a:t>
-                      </a:r>
-                    </a:p>
-                  </a:txBody>
-                  <a:tcPr anchor="ctr"/>
-                </a:tc>
-                <a:extLst>
-                  <a:ext uri="{0D108BD9-81ED-4DB2-BD59-A6C34878D82A}">
-                    <a16:rowId xmlns:a16="http://schemas.microsoft.com/office/drawing/2014/main" val="3298013591"/>
-                  </a:ext>
-                </a:extLst>
-              </a:tr>
-              <a:tr h="531843">
-                <a:tc>
-                  <a:txBody>
-                    <a:bodyPr/>
-                    <a:lstStyle/>
-                    <a:p>
-                      <a:pPr algn="ctr"/>
-                      <a:r>
-                        <a:rPr lang="en-US" dirty="0"/>
-                        <a:t>Audience interaction</a:t>
-                      </a:r>
-                    </a:p>
-                  </a:txBody>
-                  <a:tcPr anchor="ctr"/>
-                </a:tc>
-                <a:tc>
-                  <a:txBody>
-                    <a:bodyPr/>
-                    <a:lstStyle/>
-                    <a:p>
-                      <a:pPr algn="ctr"/>
-                      <a:r>
-                        <a:rPr lang="en-US" dirty="0"/>
-                        <a:t>Percentage (%)</a:t>
-                      </a:r>
-                    </a:p>
-                  </a:txBody>
-                  <a:tcPr anchor="ctr"/>
-                </a:tc>
-                <a:tc>
-                  <a:txBody>
-                    <a:bodyPr/>
-                    <a:lstStyle/>
-                    <a:p>
-                      <a:pPr algn="ctr"/>
-                      <a:r>
-                        <a:rPr lang="en-US" dirty="0"/>
-                        <a:t>85</a:t>
-                      </a:r>
-                    </a:p>
-                  </a:txBody>
-                  <a:tcPr anchor="ctr"/>
-                </a:tc>
-                <a:tc>
-                  <a:txBody>
-                    <a:bodyPr/>
-                    <a:lstStyle/>
-                    <a:p>
-                      <a:pPr algn="ctr"/>
-                      <a:r>
-                        <a:rPr lang="en-US" dirty="0"/>
-                        <a:t>88</a:t>
-                      </a:r>
-                    </a:p>
-                  </a:txBody>
-                  <a:tcPr anchor="ctr"/>
-                </a:tc>
-                <a:extLst>
-                  <a:ext uri="{0D108BD9-81ED-4DB2-BD59-A6C34878D82A}">
-                    <a16:rowId xmlns:a16="http://schemas.microsoft.com/office/drawing/2014/main" val="3873867931"/>
-                  </a:ext>
-                </a:extLst>
-              </a:tr>
-              <a:tr h="531843">
-                <a:tc>
-                  <a:txBody>
-                    <a:bodyPr/>
-                    <a:lstStyle/>
-                    <a:p>
-                      <a:pPr algn="ctr"/>
-                      <a:r>
-                        <a:rPr lang="en-US" dirty="0"/>
-                        <a:t>Knowledge retention</a:t>
-                      </a:r>
-                    </a:p>
-                  </a:txBody>
-                  <a:tcPr anchor="ctr"/>
-                </a:tc>
-                <a:tc>
-                  <a:txBody>
-                    <a:bodyPr/>
-                    <a:lstStyle/>
-                    <a:p>
-                      <a:pPr algn="ctr"/>
-                      <a:r>
-                        <a:rPr lang="en-US" dirty="0"/>
-                        <a:t>Percentage (%)</a:t>
-                      </a:r>
-                    </a:p>
-                  </a:txBody>
-                  <a:tcPr anchor="ctr"/>
-                </a:tc>
-                <a:tc>
-                  <a:txBody>
-                    <a:bodyPr/>
-                    <a:lstStyle/>
-                    <a:p>
-                      <a:pPr algn="ctr"/>
-                      <a:r>
-                        <a:rPr lang="en-US" dirty="0"/>
-                        <a:t>75</a:t>
-                      </a:r>
-                    </a:p>
-                  </a:txBody>
-                  <a:tcPr anchor="ctr"/>
-                </a:tc>
-                <a:tc>
-                  <a:txBody>
-                    <a:bodyPr/>
-                    <a:lstStyle/>
-                    <a:p>
-                      <a:pPr algn="ctr"/>
-                      <a:r>
-                        <a:rPr lang="en-US" dirty="0"/>
-                        <a:t>80</a:t>
-                      </a:r>
-                    </a:p>
-                  </a:txBody>
-                  <a:tcPr anchor="ctr"/>
-                </a:tc>
-                <a:extLst>
-                  <a:ext uri="{0D108BD9-81ED-4DB2-BD59-A6C34878D82A}">
-                    <a16:rowId xmlns:a16="http://schemas.microsoft.com/office/drawing/2014/main" val="85209771"/>
-                  </a:ext>
-                </a:extLst>
-              </a:tr>
-              <a:tr h="531843">
-                <a:tc>
-                  <a:txBody>
-                    <a:bodyPr/>
-                    <a:lstStyle/>
-                    <a:p>
-                      <a:pPr algn="ctr"/>
-                      <a:r>
-                        <a:rPr lang="en-US" dirty="0"/>
-                        <a:t>Post-presentation surveys</a:t>
-                      </a:r>
-                    </a:p>
-                  </a:txBody>
-                  <a:tcPr anchor="ctr"/>
-                </a:tc>
-                <a:tc>
-                  <a:txBody>
-                    <a:bodyPr/>
-                    <a:lstStyle/>
-                    <a:p>
-                      <a:pPr algn="ctr"/>
-                      <a:r>
-                        <a:rPr lang="en-US" dirty="0"/>
-                        <a:t>Average rating</a:t>
-                      </a:r>
-                    </a:p>
-                  </a:txBody>
-                  <a:tcPr anchor="ctr"/>
-                </a:tc>
-                <a:tc>
-                  <a:txBody>
-                    <a:bodyPr/>
-                    <a:lstStyle/>
-                    <a:p>
-                      <a:pPr algn="ctr"/>
-                      <a:r>
-                        <a:rPr lang="en-US" dirty="0"/>
-                        <a:t>4.2</a:t>
-                      </a:r>
-                    </a:p>
-                  </a:txBody>
-                  <a:tcPr anchor="ctr"/>
-                </a:tc>
-                <a:tc>
-                  <a:txBody>
-                    <a:bodyPr/>
-                    <a:lstStyle/>
-                    <a:p>
-                      <a:pPr algn="ctr"/>
-                      <a:r>
-                        <a:rPr lang="en-US" dirty="0"/>
-                        <a:t>4.5</a:t>
-                      </a:r>
-                    </a:p>
-                  </a:txBody>
-                  <a:tcPr anchor="ctr"/>
-                </a:tc>
-                <a:extLst>
-                  <a:ext uri="{0D108BD9-81ED-4DB2-BD59-A6C34878D82A}">
-                    <a16:rowId xmlns:a16="http://schemas.microsoft.com/office/drawing/2014/main" val="4061031278"/>
-                  </a:ext>
-                </a:extLst>
-              </a:tr>
-              <a:tr h="531843">
-                <a:tc>
-                  <a:txBody>
-                    <a:bodyPr/>
-                    <a:lstStyle/>
-                    <a:p>
-                      <a:pPr algn="ctr"/>
-                      <a:r>
-                        <a:rPr lang="en-US" dirty="0"/>
-                        <a:t>Referral rate</a:t>
-                      </a:r>
-                    </a:p>
-                  </a:txBody>
-                  <a:tcPr anchor="ctr"/>
-                </a:tc>
-                <a:tc>
-                  <a:txBody>
-                    <a:bodyPr/>
-                    <a:lstStyle/>
-                    <a:p>
-                      <a:pPr algn="ctr"/>
-                      <a:r>
-                        <a:rPr lang="en-US" dirty="0"/>
-                        <a:t>Percentage (%)</a:t>
-                      </a:r>
-                    </a:p>
-                  </a:txBody>
-                  <a:tcPr anchor="ctr"/>
-                </a:tc>
-                <a:tc>
-                  <a:txBody>
-                    <a:bodyPr/>
-                    <a:lstStyle/>
-                    <a:p>
-                      <a:pPr algn="ctr"/>
-                      <a:r>
-                        <a:rPr lang="en-US" dirty="0"/>
-                        <a:t>10</a:t>
-                      </a:r>
-                    </a:p>
-                  </a:txBody>
-                  <a:tcPr anchor="ctr"/>
-                </a:tc>
-                <a:tc>
-                  <a:txBody>
-                    <a:bodyPr/>
-                    <a:lstStyle/>
-                    <a:p>
-                      <a:pPr algn="ctr"/>
-                      <a:r>
-                        <a:rPr lang="en-US" dirty="0"/>
-                        <a:t>12</a:t>
-                      </a:r>
-                    </a:p>
-                  </a:txBody>
-                  <a:tcPr anchor="ctr"/>
-                </a:tc>
-                <a:extLst>
-                  <a:ext uri="{0D108BD9-81ED-4DB2-BD59-A6C34878D82A}">
-                    <a16:rowId xmlns:a16="http://schemas.microsoft.com/office/drawing/2014/main" val="3591840781"/>
-                  </a:ext>
-                </a:extLst>
-              </a:tr>
-              <a:tr h="710249">
-                <a:tc>
-                  <a:txBody>
-                    <a:bodyPr/>
-                    <a:lstStyle/>
-                    <a:p>
-                      <a:pPr algn="ctr"/>
-                      <a:r>
-                        <a:rPr lang="en-US" dirty="0"/>
-                        <a:t>Collaboration opportunities</a:t>
-                      </a:r>
-                    </a:p>
-                  </a:txBody>
-                  <a:tcPr anchor="ctr"/>
-                </a:tc>
-                <a:tc>
-                  <a:txBody>
-                    <a:bodyPr/>
-                    <a:lstStyle/>
-                    <a:p>
-                      <a:pPr algn="ctr"/>
-                      <a:r>
-                        <a:rPr lang="en-US" dirty="0"/>
-                        <a:t># of opportunities</a:t>
-                      </a:r>
-                    </a:p>
-                  </a:txBody>
-                  <a:tcPr anchor="ctr"/>
-                </a:tc>
-                <a:tc>
-                  <a:txBody>
-                    <a:bodyPr/>
-                    <a:lstStyle/>
-                    <a:p>
-                      <a:pPr algn="ctr"/>
-                      <a:r>
-                        <a:rPr lang="en-US" dirty="0"/>
-                        <a:t>8</a:t>
-                      </a:r>
-                    </a:p>
-                  </a:txBody>
-                  <a:tcPr anchor="ctr"/>
-                </a:tc>
-                <a:tc>
-                  <a:txBody>
-                    <a:bodyPr/>
-                    <a:lstStyle/>
-                    <a:p>
-                      <a:pPr algn="ctr"/>
-                      <a:r>
-                        <a:rPr lang="en-US" dirty="0"/>
-                        <a:t>10</a:t>
-                      </a:r>
-                    </a:p>
-                  </a:txBody>
-                  <a:tcPr anchor="ctr"/>
-                </a:tc>
-                <a:extLst>
-                  <a:ext uri="{0D108BD9-81ED-4DB2-BD59-A6C34878D82A}">
-                    <a16:rowId xmlns:a16="http://schemas.microsoft.com/office/drawing/2014/main" val="335389741"/>
-                  </a:ext>
-                </a:extLst>
-              </a:tr>
-            </a:tbl>
-          </a:graphicData>
-        </a:graphic>
-      </p:graphicFrame>
-      <p:sp>
-        <p:nvSpPr>
-          <p:cNvPr id="5" name="Slide Number Placeholder 5">
-            <a:extLst>
-              <a:ext uri="{FF2B5EF4-FFF2-40B4-BE49-F238E27FC236}">
-                <a16:creationId xmlns:a16="http://schemas.microsoft.com/office/drawing/2014/main" id="{4832B776-E386-1CF9-CC8F-2D2FF3EA7066}"/>
-              </a:ext>
-            </a:extLst>
-          </p:cNvPr>
-          <p:cNvSpPr>
-            <a:spLocks noGrp="1"/>
-          </p:cNvSpPr>
-          <p:nvPr>
-            <p:ph type="sldNum" sz="quarter" idx="12"/>
-          </p:nvPr>
-        </p:nvSpPr>
-        <p:spPr>
-          <a:xfrm>
-            <a:off x="10373350" y="6356349"/>
-            <a:ext cx="987552" cy="365125"/>
-          </a:xfrm>
-        </p:spPr>
+          <p:cNvPr id="2" name="Title 1">
+            <a:extLst>
+              <a:ext uri="{FF2B5EF4-FFF2-40B4-BE49-F238E27FC236}">
+                <a16:creationId xmlns:a16="http://schemas.microsoft.com/office/drawing/2014/main" id="{F7FBA250-1A4E-0D23-CE3E-85187B76A9C5}"/>
+              </a:ext>
+            </a:extLst>
+          </p:cNvPr>
+          <p:cNvSpPr>
+            <a:spLocks noGrp="1"/>
+          </p:cNvSpPr>
+          <p:nvPr>
+            <p:ph type="ctrTitle"/>
+          </p:nvPr>
+        </p:nvSpPr>
+        <p:spPr/>
         <p:txBody>
           <a:bodyPr/>
           <a:lstStyle/>
           <a:p>
-            <a:fld id="{A49DFD55-3C28-40EF-9E31-A92D2E4017FF}" type="slidenum">
-              <a:rPr lang="en-US" smtClean="0"/>
-              <a:pPr/>
-              <a:t>12</a:t>
-            </a:fld>
-            <a:endParaRPr lang="en-US" dirty="0"/>
+            <a:r>
+              <a:rPr lang="en-US" sz="3200" dirty="0"/>
+              <a:t>Self-paced work</a:t>
+            </a:r>
           </a:p>
         </p:txBody>
       </p:sp>
     </p:spTree>
     <p:extLst>
       <p:ext uri="{BB962C8B-B14F-4D97-AF65-F5344CB8AC3E}">
-        <p14:creationId xmlns:p14="http://schemas.microsoft.com/office/powerpoint/2010/main" val="2791821786"/>
+        <p14:creationId xmlns:p14="http://schemas.microsoft.com/office/powerpoint/2010/main" val="3997794848"/>
       </p:ext>
     </p:extLst>
   </p:cSld>
@@ -8639,6 +6908,64 @@
           <p:cNvPr id="2" name="Title 1">
             <a:extLst>
               <a:ext uri="{FF2B5EF4-FFF2-40B4-BE49-F238E27FC236}">
+                <a16:creationId xmlns:a16="http://schemas.microsoft.com/office/drawing/2014/main" id="{E8841E62-F784-A1E6-97C2-06B3E0B74892}"/>
+              </a:ext>
+            </a:extLst>
+          </p:cNvPr>
+          <p:cNvSpPr>
+            <a:spLocks noGrp="1"/>
+          </p:cNvSpPr>
+          <p:nvPr>
+            <p:ph type="ctrTitle"/>
+          </p:nvPr>
+        </p:nvSpPr>
+        <p:spPr/>
+        <p:txBody>
+          <a:bodyPr/>
+          <a:lstStyle/>
+          <a:p>
+            <a:r>
+              <a:rPr lang="en-US" sz="8800" dirty="0"/>
+              <a:t>GIMKIT</a:t>
+            </a:r>
+          </a:p>
+        </p:txBody>
+      </p:sp>
+    </p:spTree>
+    <p:extLst>
+      <p:ext uri="{BB962C8B-B14F-4D97-AF65-F5344CB8AC3E}">
+        <p14:creationId xmlns:p14="http://schemas.microsoft.com/office/powerpoint/2010/main" val="2103597441"/>
+      </p:ext>
+    </p:extLst>
+  </p:cSld>
+  <p:clrMapOvr>
+    <a:masterClrMapping/>
+  </p:clrMapOvr>
+</p:sld>
+</file>
+
+<file path=ppt/slides/slide14.xml><?xml version="1.0" encoding="utf-8"?>
+<p:sld xmlns:a="http://schemas.openxmlformats.org/drawingml/2006/main" xmlns:r="http://schemas.openxmlformats.org/officeDocument/2006/relationships" xmlns:p="http://schemas.openxmlformats.org/presentationml/2006/main">
+  <p:cSld>
+    <p:spTree>
+      <p:nvGrpSpPr>
+        <p:cNvPr id="1" name=""/>
+        <p:cNvGrpSpPr/>
+        <p:nvPr/>
+      </p:nvGrpSpPr>
+      <p:grpSpPr>
+        <a:xfrm>
+          <a:off x="0" y="0"/>
+          <a:ext cx="0" cy="0"/>
+          <a:chOff x="0" y="0"/>
+          <a:chExt cx="0" cy="0"/>
+        </a:xfrm>
+      </p:grpSpPr>
+      <p:sp>
+        <p:nvSpPr>
+          <p:cNvPr id="2" name="Title 1">
+            <a:extLst>
+              <a:ext uri="{FF2B5EF4-FFF2-40B4-BE49-F238E27FC236}">
                 <a16:creationId xmlns:a16="http://schemas.microsoft.com/office/drawing/2014/main" id="{8BDF1EDE-5423-435C-B149-87AB1BC22B83}"/>
               </a:ext>
             </a:extLst>
@@ -8696,27 +7023,25 @@
           <a:lstStyle/>
           <a:p>
             <a:r>
-              <a:rPr lang="en-US" dirty="0"/>
-              <a:t>Brita Tamm</a:t>
-            </a:r>
-          </a:p>
-          <a:p>
-            <a:r>
-              <a:rPr lang="en-US" dirty="0"/>
-              <a:t>502-555-0152</a:t>
-            </a:r>
-          </a:p>
-          <a:p>
-            <a:r>
-              <a:rPr lang="en-US" dirty="0"/>
-              <a:t>brita@firstupconsultants.com</a:t>
-            </a:r>
-          </a:p>
-          <a:p>
-            <a:r>
-              <a:rPr lang="en-US" dirty="0"/>
-              <a:t>www.firstupconsultants.com</a:t>
-            </a:r>
+              <a:rPr lang="en-US" b="1" dirty="0">
+                <a:solidFill>
+                  <a:schemeClr val="accent1"/>
+                </a:solidFill>
+                <a:hlinkClick r:id="rId3">
+                  <a:extLst>
+                    <a:ext uri="{A12FA001-AC4F-418D-AE19-62706E023703}">
+                      <ahyp:hlinkClr xmlns:ahyp="http://schemas.microsoft.com/office/drawing/2018/hyperlinkcolor" val="tx"/>
+                    </a:ext>
+                  </a:extLst>
+                </a:hlinkClick>
+              </a:rPr>
+              <a:t>techoutreach@hyland.com</a:t>
+            </a:r>
+            <a:endParaRPr lang="en-US" b="1" dirty="0">
+              <a:solidFill>
+                <a:schemeClr val="accent1"/>
+              </a:solidFill>
+            </a:endParaRPr>
           </a:p>
         </p:txBody>
       </p:sp>
@@ -8749,7 +7074,7 @@
             <a:fld id="{A49DFD55-3C28-40EF-9E31-A92D2E4017FF}" type="slidenum">
               <a:rPr lang="en-US" smtClean="0"/>
               <a:pPr/>
-              <a:t>13</a:t>
+              <a:t>14</a:t>
             </a:fld>
             <a:endParaRPr lang="en-US" dirty="0"/>
           </a:p>
@@ -9036,6 +7361,124 @@
           </a:prstGeom>
         </p:spPr>
       </p:pic>
+      <p:pic>
+        <p:nvPicPr>
+          <p:cNvPr id="6" name="Picture 5">
+            <a:extLst>
+              <a:ext uri="{FF2B5EF4-FFF2-40B4-BE49-F238E27FC236}">
+                <a16:creationId xmlns:a16="http://schemas.microsoft.com/office/drawing/2014/main" id="{2C212E87-324F-9BAF-348E-C1ECAF448784}"/>
+              </a:ext>
+            </a:extLst>
+          </p:cNvPr>
+          <p:cNvPicPr>
+            <a:picLocks noChangeAspect="1"/>
+          </p:cNvPicPr>
+          <p:nvPr/>
+        </p:nvPicPr>
+        <p:blipFill>
+          <a:blip r:embed="rId4"/>
+          <a:stretch>
+            <a:fillRect/>
+          </a:stretch>
+        </p:blipFill>
+        <p:spPr>
+          <a:xfrm>
+            <a:off x="5314950" y="4427513"/>
+            <a:ext cx="6019800" cy="2116400"/>
+          </a:xfrm>
+          <a:prstGeom prst="rect">
+            <a:avLst/>
+          </a:prstGeom>
+        </p:spPr>
+      </p:pic>
+      <p:cxnSp>
+        <p:nvCxnSpPr>
+          <p:cNvPr id="8" name="Straight Arrow Connector 7">
+            <a:extLst>
+              <a:ext uri="{FF2B5EF4-FFF2-40B4-BE49-F238E27FC236}">
+                <a16:creationId xmlns:a16="http://schemas.microsoft.com/office/drawing/2014/main" id="{3EE6C3F7-27C5-A8A4-E130-2B8B604C704B}"/>
+              </a:ext>
+            </a:extLst>
+          </p:cNvPr>
+          <p:cNvCxnSpPr>
+            <a:cxnSpLocks/>
+          </p:cNvCxnSpPr>
+          <p:nvPr/>
+        </p:nvCxnSpPr>
+        <p:spPr>
+          <a:xfrm flipH="1">
+            <a:off x="3714750" y="3864372"/>
+            <a:ext cx="3181350" cy="2307828"/>
+          </a:xfrm>
+          <a:prstGeom prst="straightConnector1">
+            <a:avLst/>
+          </a:prstGeom>
+          <a:ln w="76200">
+            <a:solidFill>
+              <a:schemeClr val="accent2"/>
+            </a:solidFill>
+            <a:tailEnd type="triangle"/>
+          </a:ln>
+        </p:spPr>
+        <p:style>
+          <a:lnRef idx="1">
+            <a:schemeClr val="dk1"/>
+          </a:lnRef>
+          <a:fillRef idx="0">
+            <a:schemeClr val="dk1"/>
+          </a:fillRef>
+          <a:effectRef idx="0">
+            <a:schemeClr val="dk1"/>
+          </a:effectRef>
+          <a:fontRef idx="minor">
+            <a:schemeClr val="tx1"/>
+          </a:fontRef>
+        </p:style>
+      </p:cxnSp>
+      <p:cxnSp>
+        <p:nvCxnSpPr>
+          <p:cNvPr id="10" name="Straight Arrow Connector 9">
+            <a:extLst>
+              <a:ext uri="{FF2B5EF4-FFF2-40B4-BE49-F238E27FC236}">
+                <a16:creationId xmlns:a16="http://schemas.microsoft.com/office/drawing/2014/main" id="{B2DBDC44-E404-5C49-42F3-0CB620393F19}"/>
+              </a:ext>
+            </a:extLst>
+          </p:cNvPr>
+          <p:cNvCxnSpPr>
+            <a:cxnSpLocks/>
+          </p:cNvCxnSpPr>
+          <p:nvPr/>
+        </p:nvCxnSpPr>
+        <p:spPr>
+          <a:xfrm>
+            <a:off x="6858000" y="5057775"/>
+            <a:ext cx="923925" cy="1224081"/>
+          </a:xfrm>
+          <a:prstGeom prst="straightConnector1">
+            <a:avLst/>
+          </a:prstGeom>
+          <a:ln w="76200">
+            <a:solidFill>
+              <a:schemeClr val="accent2"/>
+            </a:solidFill>
+            <a:tailEnd type="triangle"/>
+          </a:ln>
+        </p:spPr>
+        <p:style>
+          <a:lnRef idx="1">
+            <a:schemeClr val="dk1"/>
+          </a:lnRef>
+          <a:fillRef idx="0">
+            <a:schemeClr val="dk1"/>
+          </a:fillRef>
+          <a:effectRef idx="0">
+            <a:schemeClr val="dk1"/>
+          </a:effectRef>
+          <a:fontRef idx="minor">
+            <a:schemeClr val="tx1"/>
+          </a:fontRef>
+        </p:style>
+      </p:cxnSp>
     </p:spTree>
     <p:extLst>
       <p:ext uri="{BB962C8B-B14F-4D97-AF65-F5344CB8AC3E}">
@@ -9046,6 +7489,230 @@
   <p:clrMapOvr>
     <a:masterClrMapping/>
   </p:clrMapOvr>
+  <p:timing>
+    <p:tnLst>
+      <p:par>
+        <p:cTn id="1" dur="indefinite" restart="never" nodeType="tmRoot">
+          <p:childTnLst>
+            <p:seq concurrent="1" nextAc="seek">
+              <p:cTn id="2" dur="indefinite" nodeType="mainSeq">
+                <p:childTnLst>
+                  <p:par>
+                    <p:cTn id="3" fill="hold">
+                      <p:stCondLst>
+                        <p:cond delay="indefinite"/>
+                      </p:stCondLst>
+                      <p:childTnLst>
+                        <p:par>
+                          <p:cTn id="4" fill="hold">
+                            <p:stCondLst>
+                              <p:cond delay="0"/>
+                            </p:stCondLst>
+                            <p:childTnLst>
+                              <p:par>
+                                <p:cTn id="5" presetID="10" presetClass="entr" presetSubtype="0" fill="hold" nodeType="clickEffect">
+                                  <p:stCondLst>
+                                    <p:cond delay="0"/>
+                                  </p:stCondLst>
+                                  <p:childTnLst>
+                                    <p:set>
+                                      <p:cBhvr>
+                                        <p:cTn id="6" dur="1" fill="hold">
+                                          <p:stCondLst>
+                                            <p:cond delay="0"/>
+                                          </p:stCondLst>
+                                        </p:cTn>
+                                        <p:tgtEl>
+                                          <p:spTgt spid="4"/>
+                                        </p:tgtEl>
+                                        <p:attrNameLst>
+                                          <p:attrName>style.visibility</p:attrName>
+                                        </p:attrNameLst>
+                                      </p:cBhvr>
+                                      <p:to>
+                                        <p:strVal val="visible"/>
+                                      </p:to>
+                                    </p:set>
+                                    <p:animEffect transition="in" filter="fade">
+                                      <p:cBhvr>
+                                        <p:cTn id="7" dur="500"/>
+                                        <p:tgtEl>
+                                          <p:spTgt spid="4"/>
+                                        </p:tgtEl>
+                                      </p:cBhvr>
+                                    </p:animEffect>
+                                  </p:childTnLst>
+                                </p:cTn>
+                              </p:par>
+                            </p:childTnLst>
+                          </p:cTn>
+                        </p:par>
+                        <p:par>
+                          <p:cTn id="8" fill="hold">
+                            <p:stCondLst>
+                              <p:cond delay="500"/>
+                            </p:stCondLst>
+                            <p:childTnLst>
+                              <p:par>
+                                <p:cTn id="9" presetID="22" presetClass="entr" presetSubtype="2" fill="hold" nodeType="afterEffect">
+                                  <p:stCondLst>
+                                    <p:cond delay="0"/>
+                                  </p:stCondLst>
+                                  <p:childTnLst>
+                                    <p:set>
+                                      <p:cBhvr>
+                                        <p:cTn id="10" dur="1" fill="hold">
+                                          <p:stCondLst>
+                                            <p:cond delay="0"/>
+                                          </p:stCondLst>
+                                        </p:cTn>
+                                        <p:tgtEl>
+                                          <p:spTgt spid="8"/>
+                                        </p:tgtEl>
+                                        <p:attrNameLst>
+                                          <p:attrName>style.visibility</p:attrName>
+                                        </p:attrNameLst>
+                                      </p:cBhvr>
+                                      <p:to>
+                                        <p:strVal val="visible"/>
+                                      </p:to>
+                                    </p:set>
+                                    <p:animEffect transition="in" filter="wipe(right)">
+                                      <p:cBhvr>
+                                        <p:cTn id="11" dur="500"/>
+                                        <p:tgtEl>
+                                          <p:spTgt spid="8"/>
+                                        </p:tgtEl>
+                                      </p:cBhvr>
+                                    </p:animEffect>
+                                  </p:childTnLst>
+                                </p:cTn>
+                              </p:par>
+                            </p:childTnLst>
+                          </p:cTn>
+                        </p:par>
+                      </p:childTnLst>
+                    </p:cTn>
+                  </p:par>
+                  <p:par>
+                    <p:cTn id="12" fill="hold">
+                      <p:stCondLst>
+                        <p:cond delay="indefinite"/>
+                      </p:stCondLst>
+                      <p:childTnLst>
+                        <p:par>
+                          <p:cTn id="13" fill="hold">
+                            <p:stCondLst>
+                              <p:cond delay="0"/>
+                            </p:stCondLst>
+                            <p:childTnLst>
+                              <p:par>
+                                <p:cTn id="14" presetID="10" presetClass="entr" presetSubtype="0" fill="hold" nodeType="clickEffect">
+                                  <p:stCondLst>
+                                    <p:cond delay="0"/>
+                                  </p:stCondLst>
+                                  <p:childTnLst>
+                                    <p:set>
+                                      <p:cBhvr>
+                                        <p:cTn id="15" dur="1" fill="hold">
+                                          <p:stCondLst>
+                                            <p:cond delay="0"/>
+                                          </p:stCondLst>
+                                        </p:cTn>
+                                        <p:tgtEl>
+                                          <p:spTgt spid="6"/>
+                                        </p:tgtEl>
+                                        <p:attrNameLst>
+                                          <p:attrName>style.visibility</p:attrName>
+                                        </p:attrNameLst>
+                                      </p:cBhvr>
+                                      <p:to>
+                                        <p:strVal val="visible"/>
+                                      </p:to>
+                                    </p:set>
+                                    <p:animEffect transition="in" filter="fade">
+                                      <p:cBhvr>
+                                        <p:cTn id="16" dur="500"/>
+                                        <p:tgtEl>
+                                          <p:spTgt spid="6"/>
+                                        </p:tgtEl>
+                                      </p:cBhvr>
+                                    </p:animEffect>
+                                  </p:childTnLst>
+                                </p:cTn>
+                              </p:par>
+                            </p:childTnLst>
+                          </p:cTn>
+                        </p:par>
+                        <p:par>
+                          <p:cTn id="17" fill="hold">
+                            <p:stCondLst>
+                              <p:cond delay="500"/>
+                            </p:stCondLst>
+                            <p:childTnLst>
+                              <p:par>
+                                <p:cTn id="18" presetID="22" presetClass="entr" presetSubtype="1" fill="hold" nodeType="afterEffect">
+                                  <p:stCondLst>
+                                    <p:cond delay="0"/>
+                                  </p:stCondLst>
+                                  <p:childTnLst>
+                                    <p:set>
+                                      <p:cBhvr>
+                                        <p:cTn id="19" dur="1" fill="hold">
+                                          <p:stCondLst>
+                                            <p:cond delay="0"/>
+                                          </p:stCondLst>
+                                        </p:cTn>
+                                        <p:tgtEl>
+                                          <p:spTgt spid="10"/>
+                                        </p:tgtEl>
+                                        <p:attrNameLst>
+                                          <p:attrName>style.visibility</p:attrName>
+                                        </p:attrNameLst>
+                                      </p:cBhvr>
+                                      <p:to>
+                                        <p:strVal val="visible"/>
+                                      </p:to>
+                                    </p:set>
+                                    <p:animEffect transition="in" filter="wipe(up)">
+                                      <p:cBhvr>
+                                        <p:cTn id="20" dur="500"/>
+                                        <p:tgtEl>
+                                          <p:spTgt spid="10"/>
+                                        </p:tgtEl>
+                                      </p:cBhvr>
+                                    </p:animEffect>
+                                  </p:childTnLst>
+                                </p:cTn>
+                              </p:par>
+                            </p:childTnLst>
+                          </p:cTn>
+                        </p:par>
+                      </p:childTnLst>
+                    </p:cTn>
+                  </p:par>
+                </p:childTnLst>
+              </p:cTn>
+              <p:prevCondLst>
+                <p:cond evt="onPrev" delay="0">
+                  <p:tgtEl>
+                    <p:sldTgt/>
+                  </p:tgtEl>
+                </p:cond>
+              </p:prevCondLst>
+              <p:nextCondLst>
+                <p:cond evt="onNext" delay="0">
+                  <p:tgtEl>
+                    <p:sldTgt/>
+                  </p:tgtEl>
+                </p:cond>
+              </p:nextCondLst>
+            </p:seq>
+          </p:childTnLst>
+        </p:cTn>
+      </p:par>
+    </p:tnLst>
+  </p:timing>
 </p:sld>
 </file>
 
@@ -9094,14 +7761,14 @@
           <a:p>
             <a:r>
               <a:rPr lang="en-US" dirty="0"/>
-              <a:t>Overcoming nervousness</a:t>
+              <a:t>Presentation</a:t>
             </a:r>
           </a:p>
         </p:txBody>
       </p:sp>
       <p:pic>
         <p:nvPicPr>
-          <p:cNvPr id="16" name="Picture Placeholder 15" descr="A person stretching in a gym">
+          <p:cNvPr id="16" name="Picture Placeholder 15">
             <a:extLst>
               <a:ext uri="{FF2B5EF4-FFF2-40B4-BE49-F238E27FC236}">
                 <a16:creationId xmlns:a16="http://schemas.microsoft.com/office/drawing/2014/main" id="{448EF356-1822-E2AE-2794-322870D4C222}"/>
@@ -9116,8 +7783,28 @@
           </p:nvPr>
         </p:nvPicPr>
         <p:blipFill>
-          <a:blip r:embed="rId3"/>
-          <a:srcRect l="44" r="44"/>
+          <a:blip r:embed="rId3">
+            <a:alphaModFix/>
+            <a:duotone>
+              <a:prstClr val="black"/>
+              <a:schemeClr val="accent3">
+                <a:tint val="45000"/>
+                <a:satMod val="400000"/>
+              </a:schemeClr>
+            </a:duotone>
+            <a:extLst>
+              <a:ext uri="{BEBA8EAE-BF5A-486C-A8C5-ECC9F3942E4B}">
+                <a14:imgProps xmlns:a14="http://schemas.microsoft.com/office/drawing/2010/main">
+                  <a14:imgLayer r:embed="rId4">
+                    <a14:imgEffect>
+                      <a14:colorTemperature colorTemp="11500"/>
+                    </a14:imgEffect>
+                  </a14:imgLayer>
+                </a14:imgProps>
+              </a:ext>
+            </a:extLst>
+          </a:blip>
+          <a:srcRect l="23081" r="23081"/>
           <a:stretch/>
         </p:blipFill>
         <p:spPr>
@@ -9208,7 +7895,7 @@
           <p:cNvPr id="2" name="Title 1">
             <a:extLst>
               <a:ext uri="{FF2B5EF4-FFF2-40B4-BE49-F238E27FC236}">
-                <a16:creationId xmlns:a16="http://schemas.microsoft.com/office/drawing/2014/main" id="{0A32731C-311B-46F7-A865-6C3AF6B09A47}"/>
+                <a16:creationId xmlns:a16="http://schemas.microsoft.com/office/drawing/2014/main" id="{91CF4DD2-053C-93A3-00FE-44AA03101DC3}"/>
               </a:ext>
             </a:extLst>
           </p:cNvPr>
@@ -9219,92 +7906,49 @@
             <p:ph type="title"/>
           </p:nvPr>
         </p:nvSpPr>
-        <p:spPr>
-          <a:xfrm>
-            <a:off x="1322318" y="268360"/>
-            <a:ext cx="7288282" cy="2121177"/>
-          </a:xfrm>
-        </p:spPr>
+        <p:spPr/>
         <p:txBody>
           <a:bodyPr/>
           <a:lstStyle/>
           <a:p>
             <a:r>
               <a:rPr lang="en-US" dirty="0"/>
-              <a:t>Engaging the audience</a:t>
-            </a:r>
-          </a:p>
-        </p:txBody>
-      </p:sp>
-      <p:sp>
-        <p:nvSpPr>
-          <p:cNvPr id="3" name="Text Placeholder 2">
-            <a:extLst>
-              <a:ext uri="{FF2B5EF4-FFF2-40B4-BE49-F238E27FC236}">
-                <a16:creationId xmlns:a16="http://schemas.microsoft.com/office/drawing/2014/main" id="{9D5232F9-FD00-464A-9F17-619C91AEF8F3}"/>
-              </a:ext>
-            </a:extLst>
-          </p:cNvPr>
-          <p:cNvSpPr>
-            <a:spLocks noGrp="1"/>
-          </p:cNvSpPr>
-          <p:nvPr>
-            <p:ph sz="half" idx="2"/>
-          </p:nvPr>
-        </p:nvSpPr>
-        <p:spPr>
-          <a:xfrm>
-            <a:off x="1322388" y="2763078"/>
-            <a:ext cx="7288212" cy="3407051"/>
-          </a:xfrm>
-        </p:spPr>
-        <p:txBody>
-          <a:bodyPr>
-            <a:normAutofit/>
-          </a:bodyPr>
+              <a:t>What is a database?</a:t>
+            </a:r>
+          </a:p>
+        </p:txBody>
+      </p:sp>
+      <p:sp>
+        <p:nvSpPr>
+          <p:cNvPr id="3" name="Picture Placeholder 2">
+            <a:extLst>
+              <a:ext uri="{FF2B5EF4-FFF2-40B4-BE49-F238E27FC236}">
+                <a16:creationId xmlns:a16="http://schemas.microsoft.com/office/drawing/2014/main" id="{DE4E3CCB-65F5-1A2B-6FD9-ADB8D2D7059E}"/>
+              </a:ext>
+            </a:extLst>
+          </p:cNvPr>
+          <p:cNvSpPr>
+            <a:spLocks noGrp="1"/>
+          </p:cNvSpPr>
+          <p:nvPr>
+            <p:ph type="pic" sz="quarter" idx="13"/>
+          </p:nvPr>
+        </p:nvSpPr>
+        <p:spPr/>
+        <p:txBody>
+          <a:bodyPr/>
           <a:lstStyle/>
           <a:p>
-            <a:r>
-              <a:rPr lang="en-US" dirty="0"/>
-              <a:t>Techniques for connecting </a:t>
-            </a:r>
-          </a:p>
-          <a:p>
-            <a:pPr lvl="1"/>
-            <a:r>
-              <a:rPr lang="en-US" dirty="0"/>
-              <a:t>Make eye contact with your audience to create a sense of intimacy and involvement</a:t>
-            </a:r>
-          </a:p>
-          <a:p>
-            <a:pPr lvl="1"/>
-            <a:r>
-              <a:rPr lang="en-US" dirty="0"/>
-              <a:t>Weave relatable stories into your presentation using narratives that make your message memorable and impactful</a:t>
-            </a:r>
-          </a:p>
-          <a:p>
-            <a:pPr lvl="1"/>
-            <a:r>
-              <a:rPr lang="en-US" dirty="0"/>
-              <a:t>Encourage questions and provide thoughtful responses to enhance audience participation</a:t>
-            </a:r>
-          </a:p>
-          <a:p>
-            <a:pPr lvl="1"/>
-            <a:r>
-              <a:rPr lang="en-US" dirty="0"/>
-              <a:t>Use live polls or surveys to gather audience opinions, promoting engagement and making sure the audience feel involved</a:t>
-            </a:r>
-          </a:p>
-        </p:txBody>
-      </p:sp>
-      <p:sp>
-        <p:nvSpPr>
-          <p:cNvPr id="14" name="Slide Number Placeholder 5">
-            <a:extLst>
-              <a:ext uri="{FF2B5EF4-FFF2-40B4-BE49-F238E27FC236}">
-                <a16:creationId xmlns:a16="http://schemas.microsoft.com/office/drawing/2014/main" id="{ECE635A2-70B8-3EAB-6A18-952B02EBAA1E}"/>
+            <a:endParaRPr lang="en-US"/>
+          </a:p>
+        </p:txBody>
+      </p:sp>
+      <p:sp>
+        <p:nvSpPr>
+          <p:cNvPr id="4" name="Slide Number Placeholder 3">
+            <a:extLst>
+              <a:ext uri="{FF2B5EF4-FFF2-40B4-BE49-F238E27FC236}">
+                <a16:creationId xmlns:a16="http://schemas.microsoft.com/office/drawing/2014/main" id="{AE9F6B94-BE7D-C610-E06D-879F4C5D9E44}"/>
               </a:ext>
             </a:extLst>
           </p:cNvPr>
@@ -9315,12 +7959,7 @@
             <p:ph type="sldNum" sz="quarter" idx="12"/>
           </p:nvPr>
         </p:nvSpPr>
-        <p:spPr>
-          <a:xfrm>
-            <a:off x="10373350" y="6356349"/>
-            <a:ext cx="987552" cy="365125"/>
-          </a:xfrm>
-        </p:spPr>
+        <p:spPr/>
         <p:txBody>
           <a:bodyPr/>
           <a:lstStyle/>
@@ -9334,10 +7973,35 @@
           </a:p>
         </p:txBody>
       </p:sp>
+      <p:sp>
+        <p:nvSpPr>
+          <p:cNvPr id="5" name="Content Placeholder 4">
+            <a:extLst>
+              <a:ext uri="{FF2B5EF4-FFF2-40B4-BE49-F238E27FC236}">
+                <a16:creationId xmlns:a16="http://schemas.microsoft.com/office/drawing/2014/main" id="{A85E872B-B113-4DA3-2C2C-41D3E307049E}"/>
+              </a:ext>
+            </a:extLst>
+          </p:cNvPr>
+          <p:cNvSpPr>
+            <a:spLocks noGrp="1"/>
+          </p:cNvSpPr>
+          <p:nvPr>
+            <p:ph sz="half" idx="14"/>
+          </p:nvPr>
+        </p:nvSpPr>
+        <p:spPr/>
+        <p:txBody>
+          <a:bodyPr/>
+          <a:lstStyle/>
+          <a:p>
+            <a:endParaRPr lang="en-US" dirty="0"/>
+          </a:p>
+        </p:txBody>
+      </p:sp>
     </p:spTree>
     <p:extLst>
       <p:ext uri="{BB962C8B-B14F-4D97-AF65-F5344CB8AC3E}">
-        <p14:creationId xmlns:p14="http://schemas.microsoft.com/office/powerpoint/2010/main" val="3571516367"/>
+        <p14:creationId xmlns:p14="http://schemas.microsoft.com/office/powerpoint/2010/main" val="2664455833"/>
       </p:ext>
     </p:extLst>
   </p:cSld>
@@ -9369,21 +8033,21 @@
           <p:cNvPr id="2" name="Title 1">
             <a:extLst>
               <a:ext uri="{FF2B5EF4-FFF2-40B4-BE49-F238E27FC236}">
-                <a16:creationId xmlns:a16="http://schemas.microsoft.com/office/drawing/2014/main" id="{566C97BE-403B-122E-90D1-2788978A0B6F}"/>
-              </a:ext>
-            </a:extLst>
-          </p:cNvPr>
-          <p:cNvSpPr>
-            <a:spLocks noGrp="1"/>
-          </p:cNvSpPr>
-          <p:nvPr>
-            <p:ph type="ctrTitle"/>
+                <a16:creationId xmlns:a16="http://schemas.microsoft.com/office/drawing/2014/main" id="{0A32731C-311B-46F7-A865-6C3AF6B09A47}"/>
+              </a:ext>
+            </a:extLst>
+          </p:cNvPr>
+          <p:cNvSpPr>
+            <a:spLocks noGrp="1"/>
+          </p:cNvSpPr>
+          <p:nvPr>
+            <p:ph type="title"/>
           </p:nvPr>
         </p:nvSpPr>
         <p:spPr>
           <a:xfrm>
-            <a:off x="6991350" y="406400"/>
-            <a:ext cx="4179570" cy="3457971"/>
+            <a:off x="1322318" y="268360"/>
+            <a:ext cx="7288282" cy="2121177"/>
           </a:xfrm>
         </p:spPr>
         <p:txBody>
@@ -9392,15 +8056,82 @@
           <a:p>
             <a:r>
               <a:rPr lang="en-US" dirty="0"/>
-              <a:t>Selecting Visual Aids</a:t>
-            </a:r>
+              <a:t>What is data?</a:t>
+            </a:r>
+          </a:p>
+        </p:txBody>
+      </p:sp>
+      <p:sp>
+        <p:nvSpPr>
+          <p:cNvPr id="3" name="Text Placeholder 2">
+            <a:extLst>
+              <a:ext uri="{FF2B5EF4-FFF2-40B4-BE49-F238E27FC236}">
+                <a16:creationId xmlns:a16="http://schemas.microsoft.com/office/drawing/2014/main" id="{9D5232F9-FD00-464A-9F17-619C91AEF8F3}"/>
+              </a:ext>
+            </a:extLst>
+          </p:cNvPr>
+          <p:cNvSpPr>
+            <a:spLocks noGrp="1"/>
+          </p:cNvSpPr>
+          <p:nvPr>
+            <p:ph sz="half" idx="2"/>
+          </p:nvPr>
+        </p:nvSpPr>
+        <p:spPr>
+          <a:xfrm>
+            <a:off x="1322388" y="2763078"/>
+            <a:ext cx="7288212" cy="3407051"/>
+          </a:xfrm>
+        </p:spPr>
+        <p:txBody>
+          <a:bodyPr>
+            <a:normAutofit/>
+          </a:bodyPr>
+          <a:lstStyle/>
+          <a:p>
+            <a:endParaRPr lang="en-US" dirty="0"/>
+          </a:p>
+        </p:txBody>
+      </p:sp>
+      <p:sp>
+        <p:nvSpPr>
+          <p:cNvPr id="14" name="Slide Number Placeholder 5">
+            <a:extLst>
+              <a:ext uri="{FF2B5EF4-FFF2-40B4-BE49-F238E27FC236}">
+                <a16:creationId xmlns:a16="http://schemas.microsoft.com/office/drawing/2014/main" id="{ECE635A2-70B8-3EAB-6A18-952B02EBAA1E}"/>
+              </a:ext>
+            </a:extLst>
+          </p:cNvPr>
+          <p:cNvSpPr>
+            <a:spLocks noGrp="1"/>
+          </p:cNvSpPr>
+          <p:nvPr>
+            <p:ph type="sldNum" sz="quarter" idx="12"/>
+          </p:nvPr>
+        </p:nvSpPr>
+        <p:spPr>
+          <a:xfrm>
+            <a:off x="10373350" y="6356349"/>
+            <a:ext cx="987552" cy="365125"/>
+          </a:xfrm>
+        </p:spPr>
+        <p:txBody>
+          <a:bodyPr/>
+          <a:lstStyle/>
+          <a:p>
+            <a:fld id="{A49DFD55-3C28-40EF-9E31-A92D2E4017FF}" type="slidenum">
+              <a:rPr lang="en-US" smtClean="0"/>
+              <a:pPr/>
+              <a:t>6</a:t>
+            </a:fld>
+            <a:endParaRPr lang="en-US" dirty="0"/>
           </a:p>
         </p:txBody>
       </p:sp>
     </p:spTree>
     <p:extLst>
       <p:ext uri="{BB962C8B-B14F-4D97-AF65-F5344CB8AC3E}">
-        <p14:creationId xmlns:p14="http://schemas.microsoft.com/office/powerpoint/2010/main" val="334696707"/>
+        <p14:creationId xmlns:p14="http://schemas.microsoft.com/office/powerpoint/2010/main" val="3571516367"/>
       </p:ext>
     </p:extLst>
   </p:cSld>
@@ -9432,7 +8163,7 @@
           <p:cNvPr id="2" name="Title 1">
             <a:extLst>
               <a:ext uri="{FF2B5EF4-FFF2-40B4-BE49-F238E27FC236}">
-                <a16:creationId xmlns:a16="http://schemas.microsoft.com/office/drawing/2014/main" id="{A95E2E6A-35EC-1B8E-0FD7-8C67870ACA64}"/>
+                <a16:creationId xmlns:a16="http://schemas.microsoft.com/office/drawing/2014/main" id="{AD566B66-B716-090F-FA6D-A28FC22E736C}"/>
               </a:ext>
             </a:extLst>
           </p:cNvPr>
@@ -9443,29 +8174,24 @@
             <p:ph type="title"/>
           </p:nvPr>
         </p:nvSpPr>
-        <p:spPr>
-          <a:xfrm>
-            <a:off x="2933700" y="568961"/>
-            <a:ext cx="8420100" cy="1780860"/>
-          </a:xfrm>
-        </p:spPr>
+        <p:spPr/>
         <p:txBody>
           <a:bodyPr/>
           <a:lstStyle/>
           <a:p>
             <a:r>
               <a:rPr lang="en-US" dirty="0"/>
-              <a:t>Effective delivery techniques</a:t>
-            </a:r>
-          </a:p>
-        </p:txBody>
-      </p:sp>
-      <p:sp>
-        <p:nvSpPr>
-          <p:cNvPr id="12" name="Text Placeholder 11">
-            <a:extLst>
-              <a:ext uri="{FF2B5EF4-FFF2-40B4-BE49-F238E27FC236}">
-                <a16:creationId xmlns:a16="http://schemas.microsoft.com/office/drawing/2014/main" id="{554B61B9-26F6-B304-92CD-03053DAAF2A8}"/>
+              <a:t>Data vs. Information</a:t>
+            </a:r>
+          </a:p>
+        </p:txBody>
+      </p:sp>
+      <p:sp>
+        <p:nvSpPr>
+          <p:cNvPr id="3" name="Text Placeholder 2">
+            <a:extLst>
+              <a:ext uri="{FF2B5EF4-FFF2-40B4-BE49-F238E27FC236}">
+                <a16:creationId xmlns:a16="http://schemas.microsoft.com/office/drawing/2014/main" id="{76318148-7BE8-65F9-DC96-EED69E2CFBD0}"/>
               </a:ext>
             </a:extLst>
           </p:cNvPr>
@@ -9476,29 +8202,24 @@
             <p:ph type="body" idx="1"/>
           </p:nvPr>
         </p:nvSpPr>
-        <p:spPr>
-          <a:xfrm>
-            <a:off x="2933700" y="2797255"/>
-            <a:ext cx="3924300" cy="464499"/>
-          </a:xfrm>
-        </p:spPr>
+        <p:spPr/>
         <p:txBody>
           <a:bodyPr/>
           <a:lstStyle/>
           <a:p>
             <a:r>
               <a:rPr lang="en-US" dirty="0"/>
-              <a:t>Voice modulation</a:t>
-            </a:r>
-          </a:p>
-        </p:txBody>
-      </p:sp>
-      <p:sp>
-        <p:nvSpPr>
-          <p:cNvPr id="35" name="Content Placeholder 34">
-            <a:extLst>
-              <a:ext uri="{FF2B5EF4-FFF2-40B4-BE49-F238E27FC236}">
-                <a16:creationId xmlns:a16="http://schemas.microsoft.com/office/drawing/2014/main" id="{EDBE6233-75E9-40D1-968F-58CA9AD0FF50}"/>
+              <a:t>Data</a:t>
+            </a:r>
+          </a:p>
+        </p:txBody>
+      </p:sp>
+      <p:sp>
+        <p:nvSpPr>
+          <p:cNvPr id="4" name="Content Placeholder 3">
+            <a:extLst>
+              <a:ext uri="{FF2B5EF4-FFF2-40B4-BE49-F238E27FC236}">
+                <a16:creationId xmlns:a16="http://schemas.microsoft.com/office/drawing/2014/main" id="{CE2AECDB-896A-43B8-1CFC-BAB40240164A}"/>
               </a:ext>
             </a:extLst>
           </p:cNvPr>
@@ -9509,88 +8230,49 @@
             <p:ph sz="half" idx="13"/>
           </p:nvPr>
         </p:nvSpPr>
-        <p:spPr>
-          <a:xfrm>
-            <a:off x="2933700" y="3251596"/>
-            <a:ext cx="3943627" cy="3234264"/>
-          </a:xfrm>
-        </p:spPr>
-        <p:txBody>
-          <a:bodyPr>
-            <a:normAutofit/>
-          </a:bodyPr>
-          <a:lstStyle/>
-          <a:p>
-            <a:r>
-              <a:rPr lang="en-US" dirty="0"/>
-              <a:t>This is a powerful tool in public speaking. It involves varying pitch, tone, and volume to convey emotion, emphasize points, and maintain interest:</a:t>
-            </a:r>
-          </a:p>
-          <a:p>
-            <a:pPr lvl="1"/>
-            <a:r>
-              <a:rPr lang="en-US" dirty="0"/>
-              <a:t>Pitch variation</a:t>
-            </a:r>
-          </a:p>
-          <a:p>
-            <a:pPr lvl="1"/>
-            <a:r>
-              <a:rPr lang="en-US" dirty="0"/>
-              <a:t>Tone inflection</a:t>
-            </a:r>
-          </a:p>
-          <a:p>
-            <a:pPr lvl="1"/>
-            <a:r>
-              <a:rPr lang="en-US" dirty="0"/>
-              <a:t>Volume control</a:t>
-            </a:r>
-          </a:p>
-          <a:p>
-            <a:endParaRPr lang="en-US" dirty="0"/>
-          </a:p>
-        </p:txBody>
-      </p:sp>
-      <p:sp>
-        <p:nvSpPr>
-          <p:cNvPr id="14" name="Text Placeholder 13">
-            <a:extLst>
-              <a:ext uri="{FF2B5EF4-FFF2-40B4-BE49-F238E27FC236}">
-                <a16:creationId xmlns:a16="http://schemas.microsoft.com/office/drawing/2014/main" id="{CB9F9E8B-42CD-AC26-AFC9-F1F66695693B}"/>
-              </a:ext>
-            </a:extLst>
-          </p:cNvPr>
-          <p:cNvSpPr>
-            <a:spLocks noGrp="1"/>
-          </p:cNvSpPr>
-          <p:nvPr>
-            <p:ph type="body" sz="quarter" idx="3"/>
-          </p:nvPr>
-        </p:nvSpPr>
-        <p:spPr>
-          <a:xfrm>
-            <a:off x="7410173" y="2797255"/>
-            <a:ext cx="3943627" cy="464499"/>
-          </a:xfrm>
-        </p:spPr>
+        <p:spPr/>
         <p:txBody>
           <a:bodyPr/>
           <a:lstStyle/>
           <a:p>
+            <a:endParaRPr lang="en-US"/>
+          </a:p>
+        </p:txBody>
+      </p:sp>
+      <p:sp>
+        <p:nvSpPr>
+          <p:cNvPr id="5" name="Text Placeholder 4">
+            <a:extLst>
+              <a:ext uri="{FF2B5EF4-FFF2-40B4-BE49-F238E27FC236}">
+                <a16:creationId xmlns:a16="http://schemas.microsoft.com/office/drawing/2014/main" id="{7BE77684-2B18-C432-FA34-10517CD1BFC8}"/>
+              </a:ext>
+            </a:extLst>
+          </p:cNvPr>
+          <p:cNvSpPr>
+            <a:spLocks noGrp="1"/>
+          </p:cNvSpPr>
+          <p:nvPr>
+            <p:ph type="body" sz="quarter" idx="3"/>
+          </p:nvPr>
+        </p:nvSpPr>
+        <p:spPr/>
+        <p:txBody>
+          <a:bodyPr/>
+          <a:lstStyle/>
+          <a:p>
             <a:r>
               <a:rPr lang="en-US" dirty="0"/>
-              <a:t>Body language</a:t>
-            </a:r>
-          </a:p>
-        </p:txBody>
-      </p:sp>
-      <p:sp>
-        <p:nvSpPr>
-          <p:cNvPr id="50" name="Content Placeholder 49">
-            <a:extLst>
-              <a:ext uri="{FF2B5EF4-FFF2-40B4-BE49-F238E27FC236}">
-                <a16:creationId xmlns:a16="http://schemas.microsoft.com/office/drawing/2014/main" id="{8F6B2AE9-DDE4-FD99-A235-3B39EEE21481}"/>
+              <a:t>Information</a:t>
+            </a:r>
+          </a:p>
+        </p:txBody>
+      </p:sp>
+      <p:sp>
+        <p:nvSpPr>
+          <p:cNvPr id="6" name="Content Placeholder 5">
+            <a:extLst>
+              <a:ext uri="{FF2B5EF4-FFF2-40B4-BE49-F238E27FC236}">
+                <a16:creationId xmlns:a16="http://schemas.microsoft.com/office/drawing/2014/main" id="{08FFC9D7-B480-53DC-0AB3-7A3C65A3B086}"/>
               </a:ext>
             </a:extLst>
           </p:cNvPr>
@@ -9601,64 +8283,21 @@
             <p:ph sz="half" idx="14"/>
           </p:nvPr>
         </p:nvSpPr>
-        <p:spPr>
-          <a:xfrm>
-            <a:off x="7410173" y="3251595"/>
-            <a:ext cx="3943627" cy="3234264"/>
-          </a:xfrm>
-        </p:spPr>
-        <p:txBody>
-          <a:bodyPr>
-            <a:normAutofit/>
-          </a:bodyPr>
+        <p:spPr/>
+        <p:txBody>
+          <a:bodyPr/>
           <a:lstStyle/>
           <a:p>
-            <a:r>
-              <a:rPr lang="en-US" dirty="0"/>
-              <a:t>Effective body language enhances your message, making it more impactful </a:t>
-            </a:r>
-            <a:r>
-              <a:rPr lang="en-US"/>
-              <a:t>and memorable:</a:t>
-            </a:r>
-            <a:endParaRPr lang="en-US" dirty="0"/>
-          </a:p>
-          <a:p>
-            <a:pPr lvl="1"/>
-            <a:r>
-              <a:rPr lang="en-US" dirty="0"/>
-              <a:t>Meaningful eye contact</a:t>
-            </a:r>
-          </a:p>
-          <a:p>
-            <a:pPr lvl="1"/>
-            <a:r>
-              <a:rPr lang="en-US" dirty="0"/>
-              <a:t>Purposeful gestures</a:t>
-            </a:r>
-          </a:p>
-          <a:p>
-            <a:pPr lvl="1"/>
-            <a:r>
-              <a:rPr lang="en-US" dirty="0"/>
-              <a:t>Maintain good posture</a:t>
-            </a:r>
-          </a:p>
-          <a:p>
-            <a:pPr lvl="1"/>
-            <a:r>
-              <a:rPr lang="en-US" dirty="0"/>
-              <a:t>Control your expressions</a:t>
-            </a:r>
-          </a:p>
-        </p:txBody>
-      </p:sp>
-      <p:sp>
-        <p:nvSpPr>
-          <p:cNvPr id="8" name="Slide Number Placeholder 7">
-            <a:extLst>
-              <a:ext uri="{FF2B5EF4-FFF2-40B4-BE49-F238E27FC236}">
-                <a16:creationId xmlns:a16="http://schemas.microsoft.com/office/drawing/2014/main" id="{8F44A959-C2BB-9170-C99C-1A2EDB71B994}"/>
+            <a:endParaRPr lang="en-US"/>
+          </a:p>
+        </p:txBody>
+      </p:sp>
+      <p:sp>
+        <p:nvSpPr>
+          <p:cNvPr id="7" name="Slide Number Placeholder 6">
+            <a:extLst>
+              <a:ext uri="{FF2B5EF4-FFF2-40B4-BE49-F238E27FC236}">
+                <a16:creationId xmlns:a16="http://schemas.microsoft.com/office/drawing/2014/main" id="{9E5B9300-C837-F85C-B33A-EA90F94E6620}"/>
               </a:ext>
             </a:extLst>
           </p:cNvPr>
@@ -9669,12 +8308,7 @@
             <p:ph type="sldNum" sz="quarter" idx="12"/>
           </p:nvPr>
         </p:nvSpPr>
-        <p:spPr>
-          <a:xfrm>
-            <a:off x="10373350" y="6356349"/>
-            <a:ext cx="987552" cy="365125"/>
-          </a:xfrm>
-        </p:spPr>
+        <p:spPr/>
         <p:txBody>
           <a:bodyPr/>
           <a:lstStyle/>
@@ -9691,7 +8325,7 @@
     </p:spTree>
     <p:extLst>
       <p:ext uri="{BB962C8B-B14F-4D97-AF65-F5344CB8AC3E}">
-        <p14:creationId xmlns:p14="http://schemas.microsoft.com/office/powerpoint/2010/main" val="103458723"/>
+        <p14:creationId xmlns:p14="http://schemas.microsoft.com/office/powerpoint/2010/main" val="3090802129"/>
       </p:ext>
     </p:extLst>
   </p:cSld>
@@ -9723,7 +8357,7 @@
           <p:cNvPr id="2" name="Title 1">
             <a:extLst>
               <a:ext uri="{FF2B5EF4-FFF2-40B4-BE49-F238E27FC236}">
-                <a16:creationId xmlns:a16="http://schemas.microsoft.com/office/drawing/2014/main" id="{8B27D9B3-B64F-656A-0D99-161A6C0F518F}"/>
+                <a16:creationId xmlns:a16="http://schemas.microsoft.com/office/drawing/2014/main" id="{B6D956EF-7DC3-B9EE-19BA-1CB8E93B1E89}"/>
               </a:ext>
             </a:extLst>
           </p:cNvPr>
@@ -9734,224 +8368,85 @@
             <p:ph type="title"/>
           </p:nvPr>
         </p:nvSpPr>
-        <p:spPr>
-          <a:xfrm>
-            <a:off x="1341120" y="558801"/>
-            <a:ext cx="9953308" cy="1780860"/>
-          </a:xfrm>
-        </p:spPr>
+        <p:spPr/>
         <p:txBody>
           <a:bodyPr/>
           <a:lstStyle/>
           <a:p>
             <a:r>
               <a:rPr lang="en-US" dirty="0"/>
-              <a:t>Navigating Q&amp;A Sessions</a:t>
-            </a:r>
-          </a:p>
-        </p:txBody>
-      </p:sp>
-      <p:sp>
-        <p:nvSpPr>
-          <p:cNvPr id="13" name="Text Placeholder 12">
-            <a:extLst>
-              <a:ext uri="{FF2B5EF4-FFF2-40B4-BE49-F238E27FC236}">
-                <a16:creationId xmlns:a16="http://schemas.microsoft.com/office/drawing/2014/main" id="{7E5B6E40-3A7D-ACF7-AA38-25977D322D81}"/>
-              </a:ext>
-            </a:extLst>
-          </p:cNvPr>
-          <p:cNvSpPr>
-            <a:spLocks noGrp="1"/>
-          </p:cNvSpPr>
-          <p:nvPr>
-            <p:ph type="body" idx="1"/>
-          </p:nvPr>
-        </p:nvSpPr>
-        <p:spPr>
-          <a:xfrm>
-            <a:off x="1341120" y="2960877"/>
-            <a:ext cx="2722880" cy="351284"/>
-          </a:xfrm>
-        </p:spPr>
+              <a:t>Relational Databases</a:t>
+            </a:r>
+          </a:p>
+        </p:txBody>
+      </p:sp>
+      <p:sp>
+        <p:nvSpPr>
+          <p:cNvPr id="3" name="Content Placeholder 2">
+            <a:extLst>
+              <a:ext uri="{FF2B5EF4-FFF2-40B4-BE49-F238E27FC236}">
+                <a16:creationId xmlns:a16="http://schemas.microsoft.com/office/drawing/2014/main" id="{5A405F18-E438-80FA-BDF2-36C19E507F5B}"/>
+              </a:ext>
+            </a:extLst>
+          </p:cNvPr>
+          <p:cNvSpPr>
+            <a:spLocks noGrp="1"/>
+          </p:cNvSpPr>
+          <p:nvPr>
+            <p:ph sz="half" idx="16"/>
+          </p:nvPr>
+        </p:nvSpPr>
+        <p:spPr/>
         <p:txBody>
           <a:bodyPr/>
           <a:lstStyle/>
           <a:p>
-            <a:r>
-              <a:rPr lang="en-US" dirty="0"/>
-              <a:t>Preparing for questions</a:t>
-            </a:r>
-          </a:p>
-        </p:txBody>
-      </p:sp>
-      <p:sp>
-        <p:nvSpPr>
-          <p:cNvPr id="36" name="Content Placeholder 35">
-            <a:extLst>
-              <a:ext uri="{FF2B5EF4-FFF2-40B4-BE49-F238E27FC236}">
-                <a16:creationId xmlns:a16="http://schemas.microsoft.com/office/drawing/2014/main" id="{E71298F0-74F1-FECA-0F02-495F9A2EBA7B}"/>
-              </a:ext>
-            </a:extLst>
-          </p:cNvPr>
-          <p:cNvSpPr>
-            <a:spLocks noGrp="1"/>
-          </p:cNvSpPr>
-          <p:nvPr>
-            <p:ph sz="half" idx="15"/>
-          </p:nvPr>
-        </p:nvSpPr>
-        <p:spPr>
-          <a:xfrm>
-            <a:off x="1341120" y="3392035"/>
-            <a:ext cx="2722880" cy="2907164"/>
-          </a:xfrm>
-        </p:spPr>
-        <p:txBody>
-          <a:bodyPr>
-            <a:normAutofit/>
-          </a:bodyPr>
-          <a:lstStyle/>
-          <a:p>
-            <a:r>
-              <a:rPr lang="en-US" dirty="0"/>
-              <a:t>Know your material in advance</a:t>
-            </a:r>
-          </a:p>
-          <a:p>
-            <a:r>
-              <a:rPr lang="en-US" dirty="0"/>
-              <a:t>Anticipate common questions</a:t>
-            </a:r>
-          </a:p>
-          <a:p>
-            <a:r>
-              <a:rPr lang="en-US" dirty="0"/>
-              <a:t>Rehearse your responses</a:t>
-            </a:r>
-          </a:p>
-        </p:txBody>
-      </p:sp>
-      <p:sp>
-        <p:nvSpPr>
-          <p:cNvPr id="15" name="Text Placeholder 14">
-            <a:extLst>
-              <a:ext uri="{FF2B5EF4-FFF2-40B4-BE49-F238E27FC236}">
-                <a16:creationId xmlns:a16="http://schemas.microsoft.com/office/drawing/2014/main" id="{A536BD54-EFA1-25A2-9F04-4F22C36E2A5D}"/>
-              </a:ext>
-            </a:extLst>
-          </p:cNvPr>
-          <p:cNvSpPr>
-            <a:spLocks noGrp="1"/>
-          </p:cNvSpPr>
-          <p:nvPr>
-            <p:ph type="body" idx="10"/>
-          </p:nvPr>
-        </p:nvSpPr>
-        <p:spPr>
-          <a:xfrm>
-            <a:off x="4754881" y="2960877"/>
-            <a:ext cx="5516880" cy="351284"/>
-          </a:xfrm>
-        </p:spPr>
+            <a:endParaRPr lang="en-US"/>
+          </a:p>
+        </p:txBody>
+      </p:sp>
+      <p:sp>
+        <p:nvSpPr>
+          <p:cNvPr id="4" name="Table Placeholder 3">
+            <a:extLst>
+              <a:ext uri="{FF2B5EF4-FFF2-40B4-BE49-F238E27FC236}">
+                <a16:creationId xmlns:a16="http://schemas.microsoft.com/office/drawing/2014/main" id="{AA393D96-C257-33FE-0C06-0A06F0FEF04F}"/>
+              </a:ext>
+            </a:extLst>
+          </p:cNvPr>
+          <p:cNvSpPr>
+            <a:spLocks noGrp="1"/>
+          </p:cNvSpPr>
+          <p:nvPr>
+            <p:ph type="tbl" sz="quarter" idx="14"/>
+          </p:nvPr>
+        </p:nvSpPr>
+        <p:spPr/>
         <p:txBody>
           <a:bodyPr/>
           <a:lstStyle/>
           <a:p>
-            <a:r>
-              <a:rPr lang="en-US" dirty="0"/>
-              <a:t>Maintaining composure</a:t>
-            </a:r>
-          </a:p>
-          <a:p>
-            <a:endParaRPr lang="en-US" dirty="0"/>
-          </a:p>
-        </p:txBody>
-      </p:sp>
-      <p:sp>
-        <p:nvSpPr>
-          <p:cNvPr id="14" name="Content Placeholder 13">
-            <a:extLst>
-              <a:ext uri="{FF2B5EF4-FFF2-40B4-BE49-F238E27FC236}">
-                <a16:creationId xmlns:a16="http://schemas.microsoft.com/office/drawing/2014/main" id="{5112969F-EB84-49D5-7100-1FB28870FB30}"/>
-              </a:ext>
-            </a:extLst>
-          </p:cNvPr>
-          <p:cNvSpPr>
-            <a:spLocks noGrp="1"/>
-          </p:cNvSpPr>
-          <p:nvPr>
-            <p:ph sz="half" idx="14"/>
-          </p:nvPr>
-        </p:nvSpPr>
-        <p:spPr>
-          <a:xfrm>
-            <a:off x="4754881" y="3324859"/>
-            <a:ext cx="5506720" cy="3031489"/>
-          </a:xfrm>
-        </p:spPr>
-        <p:txBody>
-          <a:bodyPr>
-            <a:normAutofit/>
-          </a:bodyPr>
-          <a:lstStyle/>
-          <a:p>
-            <a:r>
-              <a:rPr lang="en-US" dirty="0"/>
-              <a:t>Maintaining composure during the Q&amp;A session is essential for projecting confidence and authority. Consider the following tips for staying composed:</a:t>
-            </a:r>
-          </a:p>
-          <a:p>
-            <a:pPr lvl="1"/>
-            <a:r>
-              <a:rPr lang="en-US" dirty="0"/>
-              <a:t>Stay calm</a:t>
-            </a:r>
-          </a:p>
-          <a:p>
-            <a:pPr lvl="1"/>
-            <a:r>
-              <a:rPr lang="en-US" dirty="0"/>
-              <a:t>Actively listen</a:t>
-            </a:r>
-          </a:p>
-          <a:p>
-            <a:pPr lvl="1"/>
-            <a:r>
-              <a:rPr lang="en-US" dirty="0"/>
-              <a:t>Pause and reflect</a:t>
-            </a:r>
-          </a:p>
-          <a:p>
-            <a:pPr lvl="1"/>
-            <a:r>
-              <a:rPr lang="en-US" dirty="0"/>
-              <a:t>Maintain eye contact</a:t>
-            </a:r>
-          </a:p>
-        </p:txBody>
-      </p:sp>
-      <p:sp>
-        <p:nvSpPr>
-          <p:cNvPr id="68" name="Slide Number Placeholder 67">
-            <a:extLst>
-              <a:ext uri="{FF2B5EF4-FFF2-40B4-BE49-F238E27FC236}">
-                <a16:creationId xmlns:a16="http://schemas.microsoft.com/office/drawing/2014/main" id="{AA0ACADD-CC4E-851C-DA07-C22DB97FA23E}"/>
-              </a:ext>
-            </a:extLst>
-          </p:cNvPr>
-          <p:cNvSpPr>
-            <a:spLocks noGrp="1"/>
-          </p:cNvSpPr>
-          <p:nvPr>
-            <p:ph type="sldNum" sz="quarter" idx="13"/>
-          </p:nvPr>
-        </p:nvSpPr>
-        <p:spPr>
-          <a:xfrm>
-            <a:off x="10373350" y="6356349"/>
-            <a:ext cx="987552" cy="365125"/>
-          </a:xfrm>
-        </p:spPr>
+            <a:endParaRPr lang="en-US"/>
+          </a:p>
+        </p:txBody>
+      </p:sp>
+      <p:sp>
+        <p:nvSpPr>
+          <p:cNvPr id="5" name="Slide Number Placeholder 4">
+            <a:extLst>
+              <a:ext uri="{FF2B5EF4-FFF2-40B4-BE49-F238E27FC236}">
+                <a16:creationId xmlns:a16="http://schemas.microsoft.com/office/drawing/2014/main" id="{5D731DF5-D154-D77D-E3A4-33ACFE9BED13}"/>
+              </a:ext>
+            </a:extLst>
+          </p:cNvPr>
+          <p:cNvSpPr>
+            <a:spLocks noGrp="1"/>
+          </p:cNvSpPr>
+          <p:nvPr>
+            <p:ph type="sldNum" sz="quarter" idx="12"/>
+          </p:nvPr>
+        </p:nvSpPr>
+        <p:spPr/>
         <p:txBody>
           <a:bodyPr/>
           <a:lstStyle/>
@@ -9968,7 +8463,7 @@
     </p:spTree>
     <p:extLst>
       <p:ext uri="{BB962C8B-B14F-4D97-AF65-F5344CB8AC3E}">
-        <p14:creationId xmlns:p14="http://schemas.microsoft.com/office/powerpoint/2010/main" val="636929804"/>
+        <p14:creationId xmlns:p14="http://schemas.microsoft.com/office/powerpoint/2010/main" val="83349718"/>
       </p:ext>
     </p:extLst>
   </p:cSld>
@@ -10000,7 +8495,7 @@
           <p:cNvPr id="2" name="Title 1">
             <a:extLst>
               <a:ext uri="{FF2B5EF4-FFF2-40B4-BE49-F238E27FC236}">
-                <a16:creationId xmlns:a16="http://schemas.microsoft.com/office/drawing/2014/main" id="{4518FC28-E0BD-4387-B8BE-9965D1A57FF1}"/>
+                <a16:creationId xmlns:a16="http://schemas.microsoft.com/office/drawing/2014/main" id="{C5D55366-D40D-3D24-D892-D29A533AED94}"/>
               </a:ext>
             </a:extLst>
           </p:cNvPr>
@@ -10011,73 +8506,157 @@
             <p:ph type="title"/>
           </p:nvPr>
         </p:nvSpPr>
-        <p:spPr>
-          <a:xfrm>
-            <a:off x="5476874" y="1671639"/>
-            <a:ext cx="5884027" cy="1204912"/>
-          </a:xfrm>
-        </p:spPr>
+        <p:spPr/>
+        <p:txBody>
+          <a:bodyPr>
+            <a:normAutofit/>
+          </a:bodyPr>
+          <a:lstStyle/>
+          <a:p>
+            <a:r>
+              <a:rPr lang="en-US" sz="9600" b="1" dirty="0"/>
+              <a:t>S</a:t>
+            </a:r>
+            <a:r>
+              <a:rPr lang="en-US" sz="4000" dirty="0"/>
+              <a:t>tructured </a:t>
+            </a:r>
+            <a:r>
+              <a:rPr lang="en-US" sz="9600" b="1" dirty="0"/>
+              <a:t>Q</a:t>
+            </a:r>
+            <a:r>
+              <a:rPr lang="en-US" sz="4000" dirty="0"/>
+              <a:t>uery </a:t>
+            </a:r>
+            <a:r>
+              <a:rPr lang="en-US" sz="9600" b="1" dirty="0"/>
+              <a:t>L</a:t>
+            </a:r>
+            <a:r>
+              <a:rPr lang="en-US" sz="4000" dirty="0"/>
+              <a:t>anguage</a:t>
+            </a:r>
+          </a:p>
+        </p:txBody>
+      </p:sp>
+      <p:sp>
+        <p:nvSpPr>
+          <p:cNvPr id="3" name="Text Placeholder 2">
+            <a:extLst>
+              <a:ext uri="{FF2B5EF4-FFF2-40B4-BE49-F238E27FC236}">
+                <a16:creationId xmlns:a16="http://schemas.microsoft.com/office/drawing/2014/main" id="{5E8BD0BD-62B5-962C-3B13-C8B290151880}"/>
+              </a:ext>
+            </a:extLst>
+          </p:cNvPr>
+          <p:cNvSpPr>
+            <a:spLocks noGrp="1"/>
+          </p:cNvSpPr>
+          <p:nvPr>
+            <p:ph type="body" idx="1"/>
+          </p:nvPr>
+        </p:nvSpPr>
+        <p:spPr/>
         <p:txBody>
           <a:bodyPr/>
           <a:lstStyle/>
           <a:p>
-            <a:r>
-              <a:rPr lang="en-US" dirty="0"/>
-              <a:t>Speaking Impact</a:t>
-            </a:r>
-          </a:p>
-        </p:txBody>
-      </p:sp>
-      <p:pic>
-        <p:nvPicPr>
-          <p:cNvPr id="47" name="Picture Placeholder 46" descr="A person smiling with a shadow on the wall">
-            <a:extLst>
-              <a:ext uri="{FF2B5EF4-FFF2-40B4-BE49-F238E27FC236}">
-                <a16:creationId xmlns:a16="http://schemas.microsoft.com/office/drawing/2014/main" id="{F55BC7A4-EE4B-7EFC-C325-408D66C3CBA7}"/>
-              </a:ext>
-            </a:extLst>
-          </p:cNvPr>
-          <p:cNvPicPr>
-            <a:picLocks noGrp="1" noChangeAspect="1"/>
-          </p:cNvPicPr>
-          <p:nvPr>
-            <p:ph type="pic" sz="quarter" idx="13"/>
-          </p:nvPr>
-        </p:nvPicPr>
-        <p:blipFill>
-          <a:blip r:embed="rId3"/>
-          <a:srcRect l="112" r="112"/>
-          <a:stretch/>
-        </p:blipFill>
-        <p:spPr>
-          <a:xfrm>
-            <a:off x="-28230" y="-9144"/>
-            <a:ext cx="5481955" cy="6876288"/>
-          </a:xfrm>
-        </p:spPr>
-      </p:pic>
-      <p:sp>
-        <p:nvSpPr>
-          <p:cNvPr id="6" name="Slide Number Placeholder 5">
-            <a:extLst>
-              <a:ext uri="{FF2B5EF4-FFF2-40B4-BE49-F238E27FC236}">
-                <a16:creationId xmlns:a16="http://schemas.microsoft.com/office/drawing/2014/main" id="{7C4B8313-9270-4128-8674-3A3E42B806BC}"/>
-              </a:ext>
-            </a:extLst>
-          </p:cNvPr>
-          <p:cNvSpPr>
-            <a:spLocks noGrp="1"/>
-          </p:cNvSpPr>
-          <p:nvPr>
-            <p:ph type="sldNum" sz="quarter" idx="12"/>
-          </p:nvPr>
-        </p:nvSpPr>
-        <p:spPr>
-          <a:xfrm>
-            <a:off x="10373350" y="6356349"/>
-            <a:ext cx="987552" cy="365125"/>
-          </a:xfrm>
-        </p:spPr>
+            <a:endParaRPr lang="en-US"/>
+          </a:p>
+        </p:txBody>
+      </p:sp>
+      <p:sp>
+        <p:nvSpPr>
+          <p:cNvPr id="4" name="Content Placeholder 3">
+            <a:extLst>
+              <a:ext uri="{FF2B5EF4-FFF2-40B4-BE49-F238E27FC236}">
+                <a16:creationId xmlns:a16="http://schemas.microsoft.com/office/drawing/2014/main" id="{170D9F77-068B-9FC4-44FE-AC1BBBDB7F94}"/>
+              </a:ext>
+            </a:extLst>
+          </p:cNvPr>
+          <p:cNvSpPr>
+            <a:spLocks noGrp="1"/>
+          </p:cNvSpPr>
+          <p:nvPr>
+            <p:ph sz="half" idx="15"/>
+          </p:nvPr>
+        </p:nvSpPr>
+        <p:spPr/>
+        <p:txBody>
+          <a:bodyPr/>
+          <a:lstStyle/>
+          <a:p>
+            <a:endParaRPr lang="en-US"/>
+          </a:p>
+        </p:txBody>
+      </p:sp>
+      <p:sp>
+        <p:nvSpPr>
+          <p:cNvPr id="5" name="Text Placeholder 4">
+            <a:extLst>
+              <a:ext uri="{FF2B5EF4-FFF2-40B4-BE49-F238E27FC236}">
+                <a16:creationId xmlns:a16="http://schemas.microsoft.com/office/drawing/2014/main" id="{5D171DE8-3CB1-0B39-D24A-04260A2E9DE7}"/>
+              </a:ext>
+            </a:extLst>
+          </p:cNvPr>
+          <p:cNvSpPr>
+            <a:spLocks noGrp="1"/>
+          </p:cNvSpPr>
+          <p:nvPr>
+            <p:ph type="body" idx="10"/>
+          </p:nvPr>
+        </p:nvSpPr>
+        <p:spPr/>
+        <p:txBody>
+          <a:bodyPr/>
+          <a:lstStyle/>
+          <a:p>
+            <a:endParaRPr lang="en-US"/>
+          </a:p>
+        </p:txBody>
+      </p:sp>
+      <p:sp>
+        <p:nvSpPr>
+          <p:cNvPr id="6" name="Content Placeholder 5">
+            <a:extLst>
+              <a:ext uri="{FF2B5EF4-FFF2-40B4-BE49-F238E27FC236}">
+                <a16:creationId xmlns:a16="http://schemas.microsoft.com/office/drawing/2014/main" id="{A2647A98-2828-5D58-D79A-456C22197BE6}"/>
+              </a:ext>
+            </a:extLst>
+          </p:cNvPr>
+          <p:cNvSpPr>
+            <a:spLocks noGrp="1"/>
+          </p:cNvSpPr>
+          <p:nvPr>
+            <p:ph sz="half" idx="14"/>
+          </p:nvPr>
+        </p:nvSpPr>
+        <p:spPr/>
+        <p:txBody>
+          <a:bodyPr/>
+          <a:lstStyle/>
+          <a:p>
+            <a:endParaRPr lang="en-US"/>
+          </a:p>
+        </p:txBody>
+      </p:sp>
+      <p:sp>
+        <p:nvSpPr>
+          <p:cNvPr id="7" name="Slide Number Placeholder 6">
+            <a:extLst>
+              <a:ext uri="{FF2B5EF4-FFF2-40B4-BE49-F238E27FC236}">
+                <a16:creationId xmlns:a16="http://schemas.microsoft.com/office/drawing/2014/main" id="{A2D443BF-9271-87BC-3605-D43E0471915C}"/>
+              </a:ext>
+            </a:extLst>
+          </p:cNvPr>
+          <p:cNvSpPr>
+            <a:spLocks noGrp="1"/>
+          </p:cNvSpPr>
+          <p:nvPr>
+            <p:ph type="sldNum" sz="quarter" idx="13"/>
+          </p:nvPr>
+        </p:nvSpPr>
+        <p:spPr/>
         <p:txBody>
           <a:bodyPr/>
           <a:lstStyle/>
@@ -10091,97 +8670,10 @@
           </a:p>
         </p:txBody>
       </p:sp>
-      <p:sp>
-        <p:nvSpPr>
-          <p:cNvPr id="3" name="Text Placeholder 2">
-            <a:extLst>
-              <a:ext uri="{FF2B5EF4-FFF2-40B4-BE49-F238E27FC236}">
-                <a16:creationId xmlns:a16="http://schemas.microsoft.com/office/drawing/2014/main" id="{FED19BCA-B61F-4EA6-A1FB-CCA3BD8506FB}"/>
-              </a:ext>
-            </a:extLst>
-          </p:cNvPr>
-          <p:cNvSpPr>
-            <a:spLocks noGrp="1"/>
-          </p:cNvSpPr>
-          <p:nvPr>
-            <p:ph sz="half" idx="14"/>
-          </p:nvPr>
-        </p:nvSpPr>
-        <p:spPr>
-          <a:xfrm>
-            <a:off x="5453725" y="3660774"/>
-            <a:ext cx="5907176" cy="2536826"/>
-          </a:xfrm>
-        </p:spPr>
-        <p:txBody>
-          <a:bodyPr>
-            <a:noAutofit/>
-          </a:bodyPr>
-          <a:lstStyle/>
-          <a:p>
-            <a:r>
-              <a:rPr lang="en-US" dirty="0"/>
-              <a:t>Your ability to communicate effectively will leave a lasting impact on your audience</a:t>
-            </a:r>
-          </a:p>
-          <a:p>
-            <a:r>
-              <a:rPr lang="en-US" dirty="0"/>
-              <a:t>Effectively communicating involves not only delivering a message but also resonating with the experiences, values, and emotions of those listening </a:t>
-            </a:r>
-          </a:p>
-        </p:txBody>
-      </p:sp>
-      <p:cxnSp>
-        <p:nvCxnSpPr>
-          <p:cNvPr id="23" name="Straight Connector 22">
-            <a:extLst>
-              <a:ext uri="{FF2B5EF4-FFF2-40B4-BE49-F238E27FC236}">
-                <a16:creationId xmlns:a16="http://schemas.microsoft.com/office/drawing/2014/main" id="{D87F08D6-2CA7-4A5A-BE34-07113DCA535D}"/>
-              </a:ext>
-              <a:ext uri="{C183D7F6-B498-43B3-948B-1728B52AA6E4}">
-                <adec:decorative xmlns:adec="http://schemas.microsoft.com/office/drawing/2017/decorative" val="1"/>
-              </a:ext>
-            </a:extLst>
-          </p:cNvPr>
-          <p:cNvCxnSpPr>
-            <a:cxnSpLocks/>
-          </p:cNvCxnSpPr>
-          <p:nvPr userDrawn="1"/>
-        </p:nvCxnSpPr>
-        <p:spPr>
-          <a:xfrm flipH="1" flipV="1">
-            <a:off x="0" y="876300"/>
-            <a:ext cx="5246255" cy="1709882"/>
-          </a:xfrm>
-          <a:prstGeom prst="line">
-            <a:avLst/>
-          </a:prstGeom>
-          <a:ln>
-            <a:solidFill>
-              <a:schemeClr val="tx1"/>
-            </a:solidFill>
-          </a:ln>
-        </p:spPr>
-        <p:style>
-          <a:lnRef idx="1">
-            <a:schemeClr val="accent1"/>
-          </a:lnRef>
-          <a:fillRef idx="0">
-            <a:schemeClr val="accent1"/>
-          </a:fillRef>
-          <a:effectRef idx="0">
-            <a:schemeClr val="accent1"/>
-          </a:effectRef>
-          <a:fontRef idx="minor">
-            <a:schemeClr val="tx1"/>
-          </a:fontRef>
-        </p:style>
-      </p:cxnSp>
     </p:spTree>
     <p:extLst>
       <p:ext uri="{BB962C8B-B14F-4D97-AF65-F5344CB8AC3E}">
-        <p14:creationId xmlns:p14="http://schemas.microsoft.com/office/powerpoint/2010/main" val="1742861620"/>
+        <p14:creationId xmlns:p14="http://schemas.microsoft.com/office/powerpoint/2010/main" val="1432764042"/>
       </p:ext>
     </p:extLst>
   </p:cSld>

</xml_diff>